<commit_message>
finished most of the powerpoint
</commit_message>
<xml_diff>
--- a/MazePrototypePresentation.pptx
+++ b/MazePrototypePresentation.pptx
@@ -6,6 +6,16 @@
   </p:sldMasterIdLst>
   <p:sldIdLst>
     <p:sldId id="256" r:id="rId2"/>
+    <p:sldId id="257" r:id="rId3"/>
+    <p:sldId id="264" r:id="rId4"/>
+    <p:sldId id="258" r:id="rId5"/>
+    <p:sldId id="265" r:id="rId6"/>
+    <p:sldId id="259" r:id="rId7"/>
+    <p:sldId id="260" r:id="rId8"/>
+    <p:sldId id="266" r:id="rId9"/>
+    <p:sldId id="261" r:id="rId10"/>
+    <p:sldId id="262" r:id="rId11"/>
+    <p:sldId id="263" r:id="rId12"/>
   </p:sldIdLst>
   <p:sldSz cx="12192000" cy="6858000"/>
   <p:notesSz cx="6858000" cy="9144000"/>
@@ -104,6 +114,11 @@
       </a:defRPr>
     </a:lvl9pPr>
   </p:defaultTextStyle>
+  <p:extLst>
+    <p:ext uri="{EFAFB233-063F-42B5-8137-9DF3F51BA10A}">
+      <p15:sldGuideLst xmlns:p15="http://schemas.microsoft.com/office/powerpoint/2012/main"/>
+    </p:ext>
+  </p:extLst>
 </p:presentation>
 </file>
 
@@ -246,7 +261,7 @@
           <a:p>
             <a:fld id="{43950FED-62B0-4150-9DCF-E73EF2857983}" type="datetimeFigureOut">
               <a:rPr lang="en-US" smtClean="0"/>
-              <a:t>10/30/2016</a:t>
+              <a:t>11/1/2016</a:t>
             </a:fld>
             <a:endParaRPr lang="en-US"/>
           </a:p>
@@ -457,7 +472,7 @@
           <a:p>
             <a:fld id="{43950FED-62B0-4150-9DCF-E73EF2857983}" type="datetimeFigureOut">
               <a:rPr lang="en-US" smtClean="0"/>
-              <a:t>10/30/2016</a:t>
+              <a:t>11/1/2016</a:t>
             </a:fld>
             <a:endParaRPr lang="en-US"/>
           </a:p>
@@ -672,7 +687,7 @@
           <a:p>
             <a:fld id="{43950FED-62B0-4150-9DCF-E73EF2857983}" type="datetimeFigureOut">
               <a:rPr lang="en-US" smtClean="0"/>
-              <a:t>10/30/2016</a:t>
+              <a:t>11/1/2016</a:t>
             </a:fld>
             <a:endParaRPr lang="en-US"/>
           </a:p>
@@ -873,7 +888,7 @@
           <a:p>
             <a:fld id="{43950FED-62B0-4150-9DCF-E73EF2857983}" type="datetimeFigureOut">
               <a:rPr lang="en-US" smtClean="0"/>
-              <a:t>10/30/2016</a:t>
+              <a:t>11/1/2016</a:t>
             </a:fld>
             <a:endParaRPr lang="en-US"/>
           </a:p>
@@ -1152,7 +1167,7 @@
           <a:p>
             <a:fld id="{43950FED-62B0-4150-9DCF-E73EF2857983}" type="datetimeFigureOut">
               <a:rPr lang="en-US" smtClean="0"/>
-              <a:t>10/30/2016</a:t>
+              <a:t>11/1/2016</a:t>
             </a:fld>
             <a:endParaRPr lang="en-US"/>
           </a:p>
@@ -1420,7 +1435,7 @@
           <a:p>
             <a:fld id="{43950FED-62B0-4150-9DCF-E73EF2857983}" type="datetimeFigureOut">
               <a:rPr lang="en-US" smtClean="0"/>
-              <a:t>10/30/2016</a:t>
+              <a:t>11/1/2016</a:t>
             </a:fld>
             <a:endParaRPr lang="en-US"/>
           </a:p>
@@ -1836,7 +1851,7 @@
           <a:p>
             <a:fld id="{43950FED-62B0-4150-9DCF-E73EF2857983}" type="datetimeFigureOut">
               <a:rPr lang="en-US" smtClean="0"/>
-              <a:t>10/30/2016</a:t>
+              <a:t>11/1/2016</a:t>
             </a:fld>
             <a:endParaRPr lang="en-US"/>
           </a:p>
@@ -1985,7 +2000,7 @@
           <a:p>
             <a:fld id="{43950FED-62B0-4150-9DCF-E73EF2857983}" type="datetimeFigureOut">
               <a:rPr lang="en-US" smtClean="0"/>
-              <a:t>10/30/2016</a:t>
+              <a:t>11/1/2016</a:t>
             </a:fld>
             <a:endParaRPr lang="en-US"/>
           </a:p>
@@ -2111,7 +2126,7 @@
           <a:p>
             <a:fld id="{43950FED-62B0-4150-9DCF-E73EF2857983}" type="datetimeFigureOut">
               <a:rPr lang="en-US" smtClean="0"/>
-              <a:t>10/30/2016</a:t>
+              <a:t>11/1/2016</a:t>
             </a:fld>
             <a:endParaRPr lang="en-US"/>
           </a:p>
@@ -2362,7 +2377,7 @@
           <a:p>
             <a:fld id="{43950FED-62B0-4150-9DCF-E73EF2857983}" type="datetimeFigureOut">
               <a:rPr lang="en-US" smtClean="0"/>
-              <a:t>10/30/2016</a:t>
+              <a:t>11/1/2016</a:t>
             </a:fld>
             <a:endParaRPr lang="en-US"/>
           </a:p>
@@ -2807,7 +2822,7 @@
           <a:p>
             <a:fld id="{43950FED-62B0-4150-9DCF-E73EF2857983}" type="datetimeFigureOut">
               <a:rPr lang="en-US" smtClean="0"/>
-              <a:t>10/30/2016</a:t>
+              <a:t>11/1/2016</a:t>
             </a:fld>
             <a:endParaRPr lang="en-US"/>
           </a:p>
@@ -3133,7 +3148,7 @@
           <a:p>
             <a:fld id="{43950FED-62B0-4150-9DCF-E73EF2857983}" type="datetimeFigureOut">
               <a:rPr lang="en-US" smtClean="0"/>
-              <a:t>10/30/2016</a:t>
+              <a:t>11/1/2016</a:t>
             </a:fld>
             <a:endParaRPr lang="en-US"/>
           </a:p>
@@ -3693,6 +3708,2619 @@
 </p:sld>
 </file>
 
+<file path=ppt/slides/slide10.xml><?xml version="1.0" encoding="utf-8"?>
+<p:sld xmlns:a="http://schemas.openxmlformats.org/drawingml/2006/main" xmlns:r="http://schemas.openxmlformats.org/officeDocument/2006/relationships" xmlns:p="http://schemas.openxmlformats.org/presentationml/2006/main">
+  <p:cSld>
+    <p:spTree>
+      <p:nvGrpSpPr>
+        <p:cNvPr id="1" name=""/>
+        <p:cNvGrpSpPr/>
+        <p:nvPr/>
+      </p:nvGrpSpPr>
+      <p:grpSpPr>
+        <a:xfrm>
+          <a:off x="0" y="0"/>
+          <a:ext cx="0" cy="0"/>
+          <a:chOff x="0" y="0"/>
+          <a:chExt cx="0" cy="0"/>
+        </a:xfrm>
+      </p:grpSpPr>
+      <p:sp>
+        <p:nvSpPr>
+          <p:cNvPr id="2" name="Title 1"/>
+          <p:cNvSpPr>
+            <a:spLocks noGrp="1"/>
+          </p:cNvSpPr>
+          <p:nvPr>
+            <p:ph type="title"/>
+          </p:nvPr>
+        </p:nvSpPr>
+        <p:spPr/>
+        <p:txBody>
+          <a:bodyPr/>
+          <a:lstStyle/>
+          <a:p>
+            <a:r>
+              <a:rPr lang="en-US" dirty="0"/>
+              <a:t>Project continuation</a:t>
+            </a:r>
+          </a:p>
+        </p:txBody>
+      </p:sp>
+      <p:sp>
+        <p:nvSpPr>
+          <p:cNvPr id="3" name="Content Placeholder 2"/>
+          <p:cNvSpPr>
+            <a:spLocks noGrp="1"/>
+          </p:cNvSpPr>
+          <p:nvPr>
+            <p:ph idx="1"/>
+          </p:nvPr>
+        </p:nvSpPr>
+        <p:spPr/>
+        <p:txBody>
+          <a:bodyPr/>
+          <a:lstStyle/>
+          <a:p>
+            <a:r>
+              <a:rPr lang="en-US" dirty="0"/>
+              <a:t>Professor Gibbons has asked us to make the final Product object oriented, which will require some manipulating and clean up</a:t>
+            </a:r>
+          </a:p>
+          <a:p>
+            <a:r>
+              <a:rPr lang="en-US" dirty="0"/>
+              <a:t>Focus will be limited to the 3D maze</a:t>
+            </a:r>
+          </a:p>
+          <a:p>
+            <a:pPr lvl="1"/>
+            <a:r>
+              <a:rPr lang="en-US" dirty="0"/>
+              <a:t>We will focus the players goal in the game</a:t>
+            </a:r>
+          </a:p>
+          <a:p>
+            <a:pPr lvl="1"/>
+            <a:r>
+              <a:rPr lang="en-US" dirty="0"/>
+              <a:t>We will have a start menu, levels that increase in difficulty, an end game condition, and a scoreboard. </a:t>
+            </a:r>
+          </a:p>
+          <a:p>
+            <a:pPr lvl="1"/>
+            <a:r>
+              <a:rPr lang="en-US" dirty="0"/>
+              <a:t>We may also </a:t>
+            </a:r>
+            <a:r>
+              <a:rPr lang="en-US"/>
+              <a:t>include hints </a:t>
+            </a:r>
+            <a:r>
+              <a:rPr lang="en-US" dirty="0"/>
+              <a:t>or power ups to make the game easier</a:t>
+            </a:r>
+          </a:p>
+        </p:txBody>
+      </p:sp>
+    </p:spTree>
+    <p:extLst>
+      <p:ext uri="{BB962C8B-B14F-4D97-AF65-F5344CB8AC3E}">
+        <p14:creationId xmlns:p14="http://schemas.microsoft.com/office/powerpoint/2010/main" val="1929081904"/>
+      </p:ext>
+    </p:extLst>
+  </p:cSld>
+  <p:clrMapOvr>
+    <a:masterClrMapping/>
+  </p:clrMapOvr>
+</p:sld>
+</file>
+
+<file path=ppt/slides/slide11.xml><?xml version="1.0" encoding="utf-8"?>
+<p:sld xmlns:a="http://schemas.openxmlformats.org/drawingml/2006/main" xmlns:r="http://schemas.openxmlformats.org/officeDocument/2006/relationships" xmlns:p="http://schemas.openxmlformats.org/presentationml/2006/main">
+  <p:cSld>
+    <p:spTree>
+      <p:nvGrpSpPr>
+        <p:cNvPr id="1" name=""/>
+        <p:cNvGrpSpPr/>
+        <p:nvPr/>
+      </p:nvGrpSpPr>
+      <p:grpSpPr>
+        <a:xfrm>
+          <a:off x="0" y="0"/>
+          <a:ext cx="0" cy="0"/>
+          <a:chOff x="0" y="0"/>
+          <a:chExt cx="0" cy="0"/>
+        </a:xfrm>
+      </p:grpSpPr>
+      <p:sp>
+        <p:nvSpPr>
+          <p:cNvPr id="2" name="Title 1"/>
+          <p:cNvSpPr>
+            <a:spLocks noGrp="1"/>
+          </p:cNvSpPr>
+          <p:nvPr>
+            <p:ph type="title"/>
+          </p:nvPr>
+        </p:nvSpPr>
+        <p:spPr/>
+        <p:txBody>
+          <a:bodyPr/>
+          <a:lstStyle/>
+          <a:p>
+            <a:r>
+              <a:rPr lang="en-US" dirty="0"/>
+              <a:t>Work cited</a:t>
+            </a:r>
+          </a:p>
+        </p:txBody>
+      </p:sp>
+      <p:sp>
+        <p:nvSpPr>
+          <p:cNvPr id="3" name="Content Placeholder 2"/>
+          <p:cNvSpPr>
+            <a:spLocks noGrp="1"/>
+          </p:cNvSpPr>
+          <p:nvPr>
+            <p:ph idx="1"/>
+          </p:nvPr>
+        </p:nvSpPr>
+        <p:spPr/>
+        <p:txBody>
+          <a:bodyPr>
+            <a:normAutofit/>
+          </a:bodyPr>
+          <a:lstStyle/>
+          <a:p>
+            <a:r>
+              <a:rPr lang="en-US" sz="1800" dirty="0"/>
+              <a:t>The Basics of Three.js, Mad Dog Tutorials, October 25 2016, </a:t>
+            </a:r>
+            <a:r>
+              <a:rPr lang="en-US" sz="1800" dirty="0">
+                <a:hlinkClick r:id="rId2"/>
+              </a:rPr>
+              <a:t>https://www.youtube.com/watch?v=9fg93FzfamU&amp;list=PLOGomoq5sDLutXOHLlESKG2j9CCnCwVqg</a:t>
+            </a:r>
+            <a:endParaRPr lang="en-US" sz="1800" dirty="0"/>
+          </a:p>
+          <a:p>
+            <a:r>
+              <a:rPr lang="en-US" sz="1800" dirty="0" err="1"/>
+              <a:t>Geometry_Minecraft_ao</a:t>
+            </a:r>
+            <a:r>
+              <a:rPr lang="en-US" sz="1800" dirty="0"/>
+              <a:t>, three.js </a:t>
+            </a:r>
+            <a:r>
+              <a:rPr lang="en-US" sz="1800" dirty="0" err="1"/>
+              <a:t>Exapmles</a:t>
+            </a:r>
+            <a:r>
+              <a:rPr lang="en-US" sz="1800" dirty="0"/>
+              <a:t>, October 27 2016, live example: </a:t>
+            </a:r>
+            <a:r>
+              <a:rPr lang="en-US" sz="1800" dirty="0">
+                <a:hlinkClick r:id="rId3"/>
+              </a:rPr>
+              <a:t>https://threejs.org/examples/#webgl_geometry_minecraft_ao</a:t>
+            </a:r>
+            <a:r>
+              <a:rPr lang="en-US" sz="1800" dirty="0"/>
+              <a:t> , source code: </a:t>
+            </a:r>
+            <a:r>
+              <a:rPr lang="en-US" sz="1800" dirty="0">
+                <a:hlinkClick r:id="rId4"/>
+              </a:rPr>
+              <a:t>https://github.com/mrdoob/three.js/blob/master/examples/webgl_geometry_minecraft_ao.html</a:t>
+            </a:r>
+            <a:r>
+              <a:rPr lang="en-US" sz="1800" dirty="0"/>
+              <a:t> </a:t>
+            </a:r>
+          </a:p>
+          <a:p>
+            <a:r>
+              <a:rPr lang="en-US" sz="1800" dirty="0"/>
+              <a:t>Babylon.js Playground</a:t>
+            </a:r>
+            <a:r>
+              <a:rPr lang="en-US" sz="1800"/>
+              <a:t>, October 30 2016, </a:t>
+            </a:r>
+            <a:endParaRPr lang="en-US" sz="1800" dirty="0"/>
+          </a:p>
+        </p:txBody>
+      </p:sp>
+    </p:spTree>
+    <p:extLst>
+      <p:ext uri="{BB962C8B-B14F-4D97-AF65-F5344CB8AC3E}">
+        <p14:creationId xmlns:p14="http://schemas.microsoft.com/office/powerpoint/2010/main" val="1015237935"/>
+      </p:ext>
+    </p:extLst>
+  </p:cSld>
+  <p:clrMapOvr>
+    <a:masterClrMapping/>
+  </p:clrMapOvr>
+</p:sld>
+</file>
+
+<file path=ppt/slides/slide2.xml><?xml version="1.0" encoding="utf-8"?>
+<p:sld xmlns:a="http://schemas.openxmlformats.org/drawingml/2006/main" xmlns:r="http://schemas.openxmlformats.org/officeDocument/2006/relationships" xmlns:p="http://schemas.openxmlformats.org/presentationml/2006/main">
+  <p:cSld>
+    <p:spTree>
+      <p:nvGrpSpPr>
+        <p:cNvPr id="1" name=""/>
+        <p:cNvGrpSpPr/>
+        <p:nvPr/>
+      </p:nvGrpSpPr>
+      <p:grpSpPr>
+        <a:xfrm>
+          <a:off x="0" y="0"/>
+          <a:ext cx="0" cy="0"/>
+          <a:chOff x="0" y="0"/>
+          <a:chExt cx="0" cy="0"/>
+        </a:xfrm>
+      </p:grpSpPr>
+      <p:sp>
+        <p:nvSpPr>
+          <p:cNvPr id="2" name="Title 1"/>
+          <p:cNvSpPr>
+            <a:spLocks noGrp="1"/>
+          </p:cNvSpPr>
+          <p:nvPr>
+            <p:ph type="title"/>
+          </p:nvPr>
+        </p:nvSpPr>
+        <p:spPr>
+          <a:xfrm>
+            <a:off x="1451579" y="1157289"/>
+            <a:ext cx="9603275" cy="696466"/>
+          </a:xfrm>
+        </p:spPr>
+        <p:txBody>
+          <a:bodyPr/>
+          <a:lstStyle/>
+          <a:p>
+            <a:pPr algn="ctr"/>
+            <a:r>
+              <a:rPr lang="en-US" dirty="0"/>
+              <a:t>Contents</a:t>
+            </a:r>
+          </a:p>
+        </p:txBody>
+      </p:sp>
+      <p:sp>
+        <p:nvSpPr>
+          <p:cNvPr id="3" name="Content Placeholder 2"/>
+          <p:cNvSpPr>
+            <a:spLocks noGrp="1"/>
+          </p:cNvSpPr>
+          <p:nvPr>
+            <p:ph idx="1"/>
+          </p:nvPr>
+        </p:nvSpPr>
+        <p:spPr/>
+        <p:txBody>
+          <a:bodyPr/>
+          <a:lstStyle/>
+          <a:p>
+            <a:pPr algn="ctr"/>
+            <a:r>
+              <a:rPr lang="en-US" dirty="0"/>
+              <a:t>Product Flow</a:t>
+            </a:r>
+          </a:p>
+          <a:p>
+            <a:pPr algn="ctr"/>
+            <a:r>
+              <a:rPr lang="en-US" dirty="0"/>
+              <a:t>Division of Labor</a:t>
+            </a:r>
+          </a:p>
+          <a:p>
+            <a:pPr algn="ctr"/>
+            <a:r>
+              <a:rPr lang="en-US" dirty="0"/>
+              <a:t>Features</a:t>
+            </a:r>
+          </a:p>
+          <a:p>
+            <a:pPr algn="ctr"/>
+            <a:r>
+              <a:rPr lang="en-US" dirty="0"/>
+              <a:t>Project Retrospect and Continuation</a:t>
+            </a:r>
+          </a:p>
+          <a:p>
+            <a:pPr algn="ctr"/>
+            <a:r>
+              <a:rPr lang="en-US" dirty="0"/>
+              <a:t>Work Cited</a:t>
+            </a:r>
+          </a:p>
+        </p:txBody>
+      </p:sp>
+    </p:spTree>
+    <p:extLst>
+      <p:ext uri="{BB962C8B-B14F-4D97-AF65-F5344CB8AC3E}">
+        <p14:creationId xmlns:p14="http://schemas.microsoft.com/office/powerpoint/2010/main" val="715432728"/>
+      </p:ext>
+    </p:extLst>
+  </p:cSld>
+  <p:clrMapOvr>
+    <a:masterClrMapping/>
+  </p:clrMapOvr>
+</p:sld>
+</file>
+
+<file path=ppt/slides/slide3.xml><?xml version="1.0" encoding="utf-8"?>
+<p:sld xmlns:a="http://schemas.openxmlformats.org/drawingml/2006/main" xmlns:r="http://schemas.openxmlformats.org/officeDocument/2006/relationships" xmlns:p="http://schemas.openxmlformats.org/presentationml/2006/main">
+  <p:cSld>
+    <p:spTree>
+      <p:nvGrpSpPr>
+        <p:cNvPr id="1" name=""/>
+        <p:cNvGrpSpPr/>
+        <p:nvPr/>
+      </p:nvGrpSpPr>
+      <p:grpSpPr>
+        <a:xfrm>
+          <a:off x="0" y="0"/>
+          <a:ext cx="0" cy="0"/>
+          <a:chOff x="0" y="0"/>
+          <a:chExt cx="0" cy="0"/>
+        </a:xfrm>
+      </p:grpSpPr>
+      <p:sp>
+        <p:nvSpPr>
+          <p:cNvPr id="2" name="Title 1"/>
+          <p:cNvSpPr>
+            <a:spLocks noGrp="1"/>
+          </p:cNvSpPr>
+          <p:nvPr>
+            <p:ph type="title"/>
+          </p:nvPr>
+        </p:nvSpPr>
+        <p:spPr/>
+        <p:txBody>
+          <a:bodyPr/>
+          <a:lstStyle/>
+          <a:p>
+            <a:r>
+              <a:rPr lang="en-US" dirty="0"/>
+              <a:t>Product Flow – Display setup</a:t>
+            </a:r>
+          </a:p>
+        </p:txBody>
+      </p:sp>
+      <p:pic>
+        <p:nvPicPr>
+          <p:cNvPr id="5" name="Content Placeholder 4"/>
+          <p:cNvPicPr>
+            <a:picLocks noGrp="1" noChangeAspect="1"/>
+          </p:cNvPicPr>
+          <p:nvPr>
+            <p:ph sz="half" idx="1"/>
+          </p:nvPr>
+        </p:nvPicPr>
+        <p:blipFill rotWithShape="1">
+          <a:blip r:embed="rId2">
+            <a:extLst>
+              <a:ext uri="{28A0092B-C50C-407E-A947-70E740481C1C}">
+                <a14:useLocalDpi xmlns:a14="http://schemas.microsoft.com/office/drawing/2010/main" val="0"/>
+              </a:ext>
+            </a:extLst>
+          </a:blip>
+          <a:srcRect l="29035" r="39239"/>
+          <a:stretch/>
+        </p:blipFill>
+        <p:spPr>
+          <a:xfrm>
+            <a:off x="186431" y="2017343"/>
+            <a:ext cx="3551068" cy="3788242"/>
+          </a:xfrm>
+        </p:spPr>
+      </p:pic>
+      <p:sp>
+        <p:nvSpPr>
+          <p:cNvPr id="4" name="Content Placeholder 3"/>
+          <p:cNvSpPr>
+            <a:spLocks noGrp="1"/>
+          </p:cNvSpPr>
+          <p:nvPr>
+            <p:ph sz="half" idx="2"/>
+          </p:nvPr>
+        </p:nvSpPr>
+        <p:spPr>
+          <a:xfrm>
+            <a:off x="3932808" y="2017343"/>
+            <a:ext cx="7126115" cy="3788242"/>
+          </a:xfrm>
+        </p:spPr>
+        <p:txBody>
+          <a:bodyPr/>
+          <a:lstStyle/>
+          <a:p>
+            <a:endParaRPr lang="en-US" dirty="0"/>
+          </a:p>
+        </p:txBody>
+      </p:sp>
+    </p:spTree>
+    <p:extLst>
+      <p:ext uri="{BB962C8B-B14F-4D97-AF65-F5344CB8AC3E}">
+        <p14:creationId xmlns:p14="http://schemas.microsoft.com/office/powerpoint/2010/main" val="1378639110"/>
+      </p:ext>
+    </p:extLst>
+  </p:cSld>
+  <p:clrMapOvr>
+    <a:masterClrMapping/>
+  </p:clrMapOvr>
+</p:sld>
+</file>
+
+<file path=ppt/slides/slide4.xml><?xml version="1.0" encoding="utf-8"?>
+<p:sld xmlns:a="http://schemas.openxmlformats.org/drawingml/2006/main" xmlns:r="http://schemas.openxmlformats.org/officeDocument/2006/relationships" xmlns:p="http://schemas.openxmlformats.org/presentationml/2006/main">
+  <p:cSld>
+    <p:spTree>
+      <p:nvGrpSpPr>
+        <p:cNvPr id="1" name=""/>
+        <p:cNvGrpSpPr/>
+        <p:nvPr/>
+      </p:nvGrpSpPr>
+      <p:grpSpPr>
+        <a:xfrm>
+          <a:off x="0" y="0"/>
+          <a:ext cx="0" cy="0"/>
+          <a:chOff x="0" y="0"/>
+          <a:chExt cx="0" cy="0"/>
+        </a:xfrm>
+      </p:grpSpPr>
+      <p:sp>
+        <p:nvSpPr>
+          <p:cNvPr id="2" name="Title 1"/>
+          <p:cNvSpPr>
+            <a:spLocks noGrp="1"/>
+          </p:cNvSpPr>
+          <p:nvPr>
+            <p:ph type="title"/>
+          </p:nvPr>
+        </p:nvSpPr>
+        <p:spPr/>
+        <p:txBody>
+          <a:bodyPr/>
+          <a:lstStyle/>
+          <a:p>
+            <a:r>
+              <a:rPr lang="en-US" dirty="0"/>
+              <a:t>Product Flow – Maze Generator</a:t>
+            </a:r>
+          </a:p>
+        </p:txBody>
+      </p:sp>
+      <p:pic>
+        <p:nvPicPr>
+          <p:cNvPr id="6" name="Content Placeholder 5"/>
+          <p:cNvPicPr>
+            <a:picLocks noGrp="1" noChangeAspect="1"/>
+          </p:cNvPicPr>
+          <p:nvPr>
+            <p:ph sz="half" idx="1"/>
+          </p:nvPr>
+        </p:nvPicPr>
+        <p:blipFill rotWithShape="1">
+          <a:blip r:embed="rId2">
+            <a:extLst>
+              <a:ext uri="{28A0092B-C50C-407E-A947-70E740481C1C}">
+                <a14:useLocalDpi xmlns:a14="http://schemas.microsoft.com/office/drawing/2010/main" val="0"/>
+              </a:ext>
+            </a:extLst>
+          </a:blip>
+          <a:srcRect r="70880"/>
+          <a:stretch/>
+        </p:blipFill>
+        <p:spPr>
+          <a:xfrm>
+            <a:off x="288846" y="2017343"/>
+            <a:ext cx="3155689" cy="3667796"/>
+          </a:xfrm>
+        </p:spPr>
+      </p:pic>
+      <p:sp>
+        <p:nvSpPr>
+          <p:cNvPr id="5" name="Content Placeholder 4"/>
+          <p:cNvSpPr>
+            <a:spLocks noGrp="1"/>
+          </p:cNvSpPr>
+          <p:nvPr>
+            <p:ph sz="half" idx="2"/>
+          </p:nvPr>
+        </p:nvSpPr>
+        <p:spPr>
+          <a:xfrm>
+            <a:off x="3719743" y="2017343"/>
+            <a:ext cx="7339179" cy="3667796"/>
+          </a:xfrm>
+        </p:spPr>
+        <p:txBody>
+          <a:bodyPr/>
+          <a:lstStyle/>
+          <a:p>
+            <a:endParaRPr lang="en-US" dirty="0"/>
+          </a:p>
+        </p:txBody>
+      </p:sp>
+    </p:spTree>
+    <p:extLst>
+      <p:ext uri="{BB962C8B-B14F-4D97-AF65-F5344CB8AC3E}">
+        <p14:creationId xmlns:p14="http://schemas.microsoft.com/office/powerpoint/2010/main" val="569452949"/>
+      </p:ext>
+    </p:extLst>
+  </p:cSld>
+  <p:clrMapOvr>
+    <a:masterClrMapping/>
+  </p:clrMapOvr>
+</p:sld>
+</file>
+
+<file path=ppt/slides/slide5.xml><?xml version="1.0" encoding="utf-8"?>
+<p:sld xmlns:a="http://schemas.openxmlformats.org/drawingml/2006/main" xmlns:r="http://schemas.openxmlformats.org/officeDocument/2006/relationships" xmlns:p="http://schemas.openxmlformats.org/presentationml/2006/main">
+  <p:cSld>
+    <p:spTree>
+      <p:nvGrpSpPr>
+        <p:cNvPr id="1" name=""/>
+        <p:cNvGrpSpPr/>
+        <p:nvPr/>
+      </p:nvGrpSpPr>
+      <p:grpSpPr>
+        <a:xfrm>
+          <a:off x="0" y="0"/>
+          <a:ext cx="0" cy="0"/>
+          <a:chOff x="0" y="0"/>
+          <a:chExt cx="0" cy="0"/>
+        </a:xfrm>
+      </p:grpSpPr>
+      <p:sp>
+        <p:nvSpPr>
+          <p:cNvPr id="2" name="Title 1"/>
+          <p:cNvSpPr>
+            <a:spLocks noGrp="1"/>
+          </p:cNvSpPr>
+          <p:nvPr>
+            <p:ph type="title"/>
+          </p:nvPr>
+        </p:nvSpPr>
+        <p:spPr/>
+        <p:txBody>
+          <a:bodyPr/>
+          <a:lstStyle/>
+          <a:p>
+            <a:r>
+              <a:rPr lang="en-US" dirty="0"/>
+              <a:t>Product Flow – Maze game runner</a:t>
+            </a:r>
+          </a:p>
+        </p:txBody>
+      </p:sp>
+      <p:pic>
+        <p:nvPicPr>
+          <p:cNvPr id="5" name="Content Placeholder 4"/>
+          <p:cNvPicPr>
+            <a:picLocks noGrp="1" noChangeAspect="1"/>
+          </p:cNvPicPr>
+          <p:nvPr>
+            <p:ph sz="half" idx="1"/>
+          </p:nvPr>
+        </p:nvPicPr>
+        <p:blipFill rotWithShape="1">
+          <a:blip r:embed="rId2">
+            <a:extLst>
+              <a:ext uri="{28A0092B-C50C-407E-A947-70E740481C1C}">
+                <a14:useLocalDpi xmlns:a14="http://schemas.microsoft.com/office/drawing/2010/main" val="0"/>
+              </a:ext>
+            </a:extLst>
+          </a:blip>
+          <a:srcRect l="60952"/>
+          <a:stretch/>
+        </p:blipFill>
+        <p:spPr>
+          <a:xfrm>
+            <a:off x="239697" y="2017343"/>
+            <a:ext cx="4456589" cy="3862796"/>
+          </a:xfrm>
+        </p:spPr>
+      </p:pic>
+      <p:sp>
+        <p:nvSpPr>
+          <p:cNvPr id="4" name="Content Placeholder 3"/>
+          <p:cNvSpPr>
+            <a:spLocks noGrp="1"/>
+          </p:cNvSpPr>
+          <p:nvPr>
+            <p:ph sz="half" idx="2"/>
+          </p:nvPr>
+        </p:nvSpPr>
+        <p:spPr>
+          <a:xfrm>
+            <a:off x="4820575" y="2017343"/>
+            <a:ext cx="6238348" cy="3862796"/>
+          </a:xfrm>
+        </p:spPr>
+        <p:txBody>
+          <a:bodyPr/>
+          <a:lstStyle/>
+          <a:p>
+            <a:endParaRPr lang="en-US" dirty="0"/>
+          </a:p>
+        </p:txBody>
+      </p:sp>
+    </p:spTree>
+    <p:extLst>
+      <p:ext uri="{BB962C8B-B14F-4D97-AF65-F5344CB8AC3E}">
+        <p14:creationId xmlns:p14="http://schemas.microsoft.com/office/powerpoint/2010/main" val="3346028282"/>
+      </p:ext>
+    </p:extLst>
+  </p:cSld>
+  <p:clrMapOvr>
+    <a:masterClrMapping/>
+  </p:clrMapOvr>
+</p:sld>
+</file>
+
+<file path=ppt/slides/slide6.xml><?xml version="1.0" encoding="utf-8"?>
+<p:sld xmlns:a="http://schemas.openxmlformats.org/drawingml/2006/main" xmlns:r="http://schemas.openxmlformats.org/officeDocument/2006/relationships" xmlns:p="http://schemas.openxmlformats.org/presentationml/2006/main">
+  <p:cSld>
+    <p:spTree>
+      <p:nvGrpSpPr>
+        <p:cNvPr id="1" name=""/>
+        <p:cNvGrpSpPr/>
+        <p:nvPr/>
+      </p:nvGrpSpPr>
+      <p:grpSpPr>
+        <a:xfrm>
+          <a:off x="0" y="0"/>
+          <a:ext cx="0" cy="0"/>
+          <a:chOff x="0" y="0"/>
+          <a:chExt cx="0" cy="0"/>
+        </a:xfrm>
+      </p:grpSpPr>
+      <p:sp>
+        <p:nvSpPr>
+          <p:cNvPr id="16" name="Title 3"/>
+          <p:cNvSpPr>
+            <a:spLocks noGrp="1"/>
+          </p:cNvSpPr>
+          <p:nvPr>
+            <p:ph type="title"/>
+          </p:nvPr>
+        </p:nvSpPr>
+        <p:spPr>
+          <a:xfrm>
+            <a:off x="1137309" y="1064858"/>
+            <a:ext cx="9905999" cy="766354"/>
+          </a:xfrm>
+        </p:spPr>
+        <p:txBody>
+          <a:bodyPr>
+            <a:normAutofit/>
+          </a:bodyPr>
+          <a:lstStyle/>
+          <a:p>
+            <a:pPr algn="ctr"/>
+            <a:r>
+              <a:rPr lang="en-US" dirty="0"/>
+              <a:t>Division of labor</a:t>
+            </a:r>
+          </a:p>
+        </p:txBody>
+      </p:sp>
+      <p:sp>
+        <p:nvSpPr>
+          <p:cNvPr id="17" name="Text Placeholder 4"/>
+          <p:cNvSpPr txBox="1">
+            <a:spLocks/>
+          </p:cNvSpPr>
+          <p:nvPr/>
+        </p:nvSpPr>
+        <p:spPr>
+          <a:xfrm>
+            <a:off x="1137309" y="1831212"/>
+            <a:ext cx="3195240" cy="576259"/>
+          </a:xfrm>
+          <a:prstGeom prst="rect">
+            <a:avLst/>
+          </a:prstGeom>
+        </p:spPr>
+        <p:txBody>
+          <a:bodyPr vert="horz" lIns="91440" tIns="45720" rIns="91440" bIns="45720" rtlCol="0" anchor="t">
+            <a:normAutofit lnSpcReduction="10000"/>
+          </a:bodyPr>
+          <a:lstStyle>
+            <a:lvl1pPr marL="228600" indent="-228600" algn="l" defTabSz="914400" rtl="0" eaLnBrk="1" latinLnBrk="0" hangingPunct="1">
+              <a:lnSpc>
+                <a:spcPct val="120000"/>
+              </a:lnSpc>
+              <a:spcBef>
+                <a:spcPts val="1000"/>
+              </a:spcBef>
+              <a:buClr>
+                <a:schemeClr val="accent1"/>
+              </a:buClr>
+              <a:buSzPct val="100000"/>
+              <a:buFont typeface="Arial" panose="020B0604020202020204" pitchFamily="34" charset="0"/>
+              <a:buChar char="•"/>
+              <a:defRPr sz="2000" kern="1200">
+                <a:solidFill>
+                  <a:schemeClr val="tx1"/>
+                </a:solidFill>
+                <a:effectLst/>
+                <a:latin typeface="+mn-lt"/>
+                <a:ea typeface="+mn-ea"/>
+                <a:cs typeface="+mn-cs"/>
+              </a:defRPr>
+            </a:lvl1pPr>
+            <a:lvl2pPr marL="685800" indent="-228600" algn="l" defTabSz="914400" rtl="0" eaLnBrk="1" latinLnBrk="0" hangingPunct="1">
+              <a:lnSpc>
+                <a:spcPct val="120000"/>
+              </a:lnSpc>
+              <a:spcBef>
+                <a:spcPts val="500"/>
+              </a:spcBef>
+              <a:buClr>
+                <a:schemeClr val="accent1"/>
+              </a:buClr>
+              <a:buSzPct val="100000"/>
+              <a:buFont typeface="Arial" panose="020B0604020202020204" pitchFamily="34" charset="0"/>
+              <a:buChar char="•"/>
+              <a:defRPr sz="1800" kern="1200" cap="none" baseline="0">
+                <a:solidFill>
+                  <a:schemeClr val="tx1"/>
+                </a:solidFill>
+                <a:effectLst/>
+                <a:latin typeface="+mn-lt"/>
+                <a:ea typeface="+mn-ea"/>
+                <a:cs typeface="+mn-cs"/>
+              </a:defRPr>
+            </a:lvl2pPr>
+            <a:lvl3pPr marL="1143000" indent="-228600" algn="l" defTabSz="914400" rtl="0" eaLnBrk="1" latinLnBrk="0" hangingPunct="1">
+              <a:lnSpc>
+                <a:spcPct val="120000"/>
+              </a:lnSpc>
+              <a:spcBef>
+                <a:spcPts val="500"/>
+              </a:spcBef>
+              <a:buClr>
+                <a:schemeClr val="accent1"/>
+              </a:buClr>
+              <a:buSzPct val="100000"/>
+              <a:buFont typeface="Arial" panose="020B0604020202020204" pitchFamily="34" charset="0"/>
+              <a:buChar char="•"/>
+              <a:defRPr sz="1600" kern="1200">
+                <a:solidFill>
+                  <a:schemeClr val="tx1"/>
+                </a:solidFill>
+                <a:effectLst/>
+                <a:latin typeface="+mn-lt"/>
+                <a:ea typeface="+mn-ea"/>
+                <a:cs typeface="+mn-cs"/>
+              </a:defRPr>
+            </a:lvl3pPr>
+            <a:lvl4pPr marL="1600200" indent="-228600" algn="l" defTabSz="914400" rtl="0" eaLnBrk="1" latinLnBrk="0" hangingPunct="1">
+              <a:lnSpc>
+                <a:spcPct val="120000"/>
+              </a:lnSpc>
+              <a:spcBef>
+                <a:spcPts val="500"/>
+              </a:spcBef>
+              <a:buClr>
+                <a:schemeClr val="accent1"/>
+              </a:buClr>
+              <a:buSzPct val="100000"/>
+              <a:buFont typeface="Arial" panose="020B0604020202020204" pitchFamily="34" charset="0"/>
+              <a:buChar char="•"/>
+              <a:defRPr sz="1400" kern="1200" cap="none" baseline="0">
+                <a:solidFill>
+                  <a:schemeClr val="tx1"/>
+                </a:solidFill>
+                <a:effectLst/>
+                <a:latin typeface="+mn-lt"/>
+                <a:ea typeface="+mn-ea"/>
+                <a:cs typeface="+mn-cs"/>
+              </a:defRPr>
+            </a:lvl4pPr>
+            <a:lvl5pPr marL="2057400" indent="-228600" algn="l" defTabSz="914400" rtl="0" eaLnBrk="1" latinLnBrk="0" hangingPunct="1">
+              <a:lnSpc>
+                <a:spcPct val="120000"/>
+              </a:lnSpc>
+              <a:spcBef>
+                <a:spcPts val="500"/>
+              </a:spcBef>
+              <a:buClr>
+                <a:schemeClr val="accent1"/>
+              </a:buClr>
+              <a:buSzPct val="100000"/>
+              <a:buFont typeface="Arial" panose="020B0604020202020204" pitchFamily="34" charset="0"/>
+              <a:buChar char="•"/>
+              <a:defRPr sz="1200" kern="1200">
+                <a:solidFill>
+                  <a:schemeClr val="tx1"/>
+                </a:solidFill>
+                <a:effectLst/>
+                <a:latin typeface="+mn-lt"/>
+                <a:ea typeface="+mn-ea"/>
+                <a:cs typeface="+mn-cs"/>
+              </a:defRPr>
+            </a:lvl5pPr>
+            <a:lvl6pPr marL="2514600" indent="-228600" algn="l" defTabSz="914400" rtl="0" eaLnBrk="1" latinLnBrk="0" hangingPunct="1">
+              <a:lnSpc>
+                <a:spcPct val="120000"/>
+              </a:lnSpc>
+              <a:spcBef>
+                <a:spcPts val="500"/>
+              </a:spcBef>
+              <a:buClr>
+                <a:schemeClr val="accent1"/>
+              </a:buClr>
+              <a:buSzPct val="100000"/>
+              <a:buFont typeface="Arial" panose="020B0604020202020204" pitchFamily="34" charset="0"/>
+              <a:buChar char="•"/>
+              <a:defRPr sz="1200" kern="1200">
+                <a:solidFill>
+                  <a:schemeClr val="tx1"/>
+                </a:solidFill>
+                <a:effectLst/>
+                <a:latin typeface="+mn-lt"/>
+                <a:ea typeface="+mn-ea"/>
+                <a:cs typeface="+mn-cs"/>
+              </a:defRPr>
+            </a:lvl6pPr>
+            <a:lvl7pPr marL="2971800" indent="-228600" algn="l" defTabSz="914400" rtl="0" eaLnBrk="1" latinLnBrk="0" hangingPunct="1">
+              <a:lnSpc>
+                <a:spcPct val="120000"/>
+              </a:lnSpc>
+              <a:spcBef>
+                <a:spcPts val="500"/>
+              </a:spcBef>
+              <a:buClr>
+                <a:schemeClr val="accent1"/>
+              </a:buClr>
+              <a:buSzPct val="100000"/>
+              <a:buFont typeface="Arial" panose="020B0604020202020204" pitchFamily="34" charset="0"/>
+              <a:buChar char="•"/>
+              <a:defRPr sz="1200" kern="1200">
+                <a:solidFill>
+                  <a:schemeClr val="tx1"/>
+                </a:solidFill>
+                <a:effectLst/>
+                <a:latin typeface="+mn-lt"/>
+                <a:ea typeface="+mn-ea"/>
+                <a:cs typeface="+mn-cs"/>
+              </a:defRPr>
+            </a:lvl7pPr>
+            <a:lvl8pPr marL="3429000" indent="-228600" algn="l" defTabSz="914400" rtl="0" eaLnBrk="1" latinLnBrk="0" hangingPunct="1">
+              <a:lnSpc>
+                <a:spcPct val="120000"/>
+              </a:lnSpc>
+              <a:spcBef>
+                <a:spcPts val="500"/>
+              </a:spcBef>
+              <a:buClr>
+                <a:schemeClr val="accent1"/>
+              </a:buClr>
+              <a:buSzPct val="100000"/>
+              <a:buFont typeface="Arial" panose="020B0604020202020204" pitchFamily="34" charset="0"/>
+              <a:buChar char="•"/>
+              <a:defRPr sz="1200" kern="1200" baseline="0">
+                <a:solidFill>
+                  <a:schemeClr val="tx1"/>
+                </a:solidFill>
+                <a:effectLst/>
+                <a:latin typeface="+mn-lt"/>
+                <a:ea typeface="+mn-ea"/>
+                <a:cs typeface="+mn-cs"/>
+              </a:defRPr>
+            </a:lvl8pPr>
+            <a:lvl9pPr marL="3886200" indent="-228600" algn="l" defTabSz="914400" rtl="0" eaLnBrk="1" latinLnBrk="0" hangingPunct="1">
+              <a:lnSpc>
+                <a:spcPct val="120000"/>
+              </a:lnSpc>
+              <a:spcBef>
+                <a:spcPts val="500"/>
+              </a:spcBef>
+              <a:buClr>
+                <a:schemeClr val="accent1"/>
+              </a:buClr>
+              <a:buSzPct val="100000"/>
+              <a:buFont typeface="Arial" panose="020B0604020202020204" pitchFamily="34" charset="0"/>
+              <a:buChar char="•"/>
+              <a:defRPr sz="1200" kern="1200" baseline="0">
+                <a:solidFill>
+                  <a:schemeClr val="tx1"/>
+                </a:solidFill>
+                <a:effectLst/>
+                <a:latin typeface="+mn-lt"/>
+                <a:ea typeface="+mn-ea"/>
+                <a:cs typeface="+mn-cs"/>
+              </a:defRPr>
+            </a:lvl9pPr>
+          </a:lstStyle>
+          <a:p>
+            <a:pPr algn="ctr"/>
+            <a:r>
+              <a:rPr lang="en-US" sz="2800"/>
+              <a:t>Stephen Fulton	</a:t>
+            </a:r>
+            <a:endParaRPr lang="en-US" sz="2800" dirty="0"/>
+          </a:p>
+        </p:txBody>
+      </p:sp>
+      <p:sp>
+        <p:nvSpPr>
+          <p:cNvPr id="18" name="Text Placeholder 8"/>
+          <p:cNvSpPr txBox="1">
+            <a:spLocks/>
+          </p:cNvSpPr>
+          <p:nvPr/>
+        </p:nvSpPr>
+        <p:spPr>
+          <a:xfrm>
+            <a:off x="1137309" y="2669176"/>
+            <a:ext cx="3195240" cy="3935067"/>
+          </a:xfrm>
+          <a:prstGeom prst="rect">
+            <a:avLst/>
+          </a:prstGeom>
+        </p:spPr>
+        <p:txBody>
+          <a:bodyPr>
+            <a:normAutofit/>
+          </a:bodyPr>
+          <a:lstStyle>
+            <a:lvl1pPr marL="228600" indent="-228600" algn="l" defTabSz="914400" rtl="0" eaLnBrk="1" latinLnBrk="0" hangingPunct="1">
+              <a:lnSpc>
+                <a:spcPct val="120000"/>
+              </a:lnSpc>
+              <a:spcBef>
+                <a:spcPts val="1000"/>
+              </a:spcBef>
+              <a:buClr>
+                <a:schemeClr val="accent1"/>
+              </a:buClr>
+              <a:buSzPct val="100000"/>
+              <a:buFont typeface="Arial" panose="020B0604020202020204" pitchFamily="34" charset="0"/>
+              <a:buChar char="•"/>
+              <a:defRPr sz="2000" kern="1200">
+                <a:solidFill>
+                  <a:schemeClr val="tx1"/>
+                </a:solidFill>
+                <a:effectLst/>
+                <a:latin typeface="+mn-lt"/>
+                <a:ea typeface="+mn-ea"/>
+                <a:cs typeface="+mn-cs"/>
+              </a:defRPr>
+            </a:lvl1pPr>
+            <a:lvl2pPr marL="685800" indent="-228600" algn="l" defTabSz="914400" rtl="0" eaLnBrk="1" latinLnBrk="0" hangingPunct="1">
+              <a:lnSpc>
+                <a:spcPct val="120000"/>
+              </a:lnSpc>
+              <a:spcBef>
+                <a:spcPts val="500"/>
+              </a:spcBef>
+              <a:buClr>
+                <a:schemeClr val="accent1"/>
+              </a:buClr>
+              <a:buSzPct val="100000"/>
+              <a:buFont typeface="Arial" panose="020B0604020202020204" pitchFamily="34" charset="0"/>
+              <a:buChar char="•"/>
+              <a:defRPr sz="1800" kern="1200" cap="none" baseline="0">
+                <a:solidFill>
+                  <a:schemeClr val="tx1"/>
+                </a:solidFill>
+                <a:effectLst/>
+                <a:latin typeface="+mn-lt"/>
+                <a:ea typeface="+mn-ea"/>
+                <a:cs typeface="+mn-cs"/>
+              </a:defRPr>
+            </a:lvl2pPr>
+            <a:lvl3pPr marL="1143000" indent="-228600" algn="l" defTabSz="914400" rtl="0" eaLnBrk="1" latinLnBrk="0" hangingPunct="1">
+              <a:lnSpc>
+                <a:spcPct val="120000"/>
+              </a:lnSpc>
+              <a:spcBef>
+                <a:spcPts val="500"/>
+              </a:spcBef>
+              <a:buClr>
+                <a:schemeClr val="accent1"/>
+              </a:buClr>
+              <a:buSzPct val="100000"/>
+              <a:buFont typeface="Arial" panose="020B0604020202020204" pitchFamily="34" charset="0"/>
+              <a:buChar char="•"/>
+              <a:defRPr sz="1600" kern="1200">
+                <a:solidFill>
+                  <a:schemeClr val="tx1"/>
+                </a:solidFill>
+                <a:effectLst/>
+                <a:latin typeface="+mn-lt"/>
+                <a:ea typeface="+mn-ea"/>
+                <a:cs typeface="+mn-cs"/>
+              </a:defRPr>
+            </a:lvl3pPr>
+            <a:lvl4pPr marL="1600200" indent="-228600" algn="l" defTabSz="914400" rtl="0" eaLnBrk="1" latinLnBrk="0" hangingPunct="1">
+              <a:lnSpc>
+                <a:spcPct val="120000"/>
+              </a:lnSpc>
+              <a:spcBef>
+                <a:spcPts val="500"/>
+              </a:spcBef>
+              <a:buClr>
+                <a:schemeClr val="accent1"/>
+              </a:buClr>
+              <a:buSzPct val="100000"/>
+              <a:buFont typeface="Arial" panose="020B0604020202020204" pitchFamily="34" charset="0"/>
+              <a:buChar char="•"/>
+              <a:defRPr sz="1400" kern="1200" cap="none" baseline="0">
+                <a:solidFill>
+                  <a:schemeClr val="tx1"/>
+                </a:solidFill>
+                <a:effectLst/>
+                <a:latin typeface="+mn-lt"/>
+                <a:ea typeface="+mn-ea"/>
+                <a:cs typeface="+mn-cs"/>
+              </a:defRPr>
+            </a:lvl4pPr>
+            <a:lvl5pPr marL="2057400" indent="-228600" algn="l" defTabSz="914400" rtl="0" eaLnBrk="1" latinLnBrk="0" hangingPunct="1">
+              <a:lnSpc>
+                <a:spcPct val="120000"/>
+              </a:lnSpc>
+              <a:spcBef>
+                <a:spcPts val="500"/>
+              </a:spcBef>
+              <a:buClr>
+                <a:schemeClr val="accent1"/>
+              </a:buClr>
+              <a:buSzPct val="100000"/>
+              <a:buFont typeface="Arial" panose="020B0604020202020204" pitchFamily="34" charset="0"/>
+              <a:buChar char="•"/>
+              <a:defRPr sz="1200" kern="1200">
+                <a:solidFill>
+                  <a:schemeClr val="tx1"/>
+                </a:solidFill>
+                <a:effectLst/>
+                <a:latin typeface="+mn-lt"/>
+                <a:ea typeface="+mn-ea"/>
+                <a:cs typeface="+mn-cs"/>
+              </a:defRPr>
+            </a:lvl5pPr>
+            <a:lvl6pPr marL="2514600" indent="-228600" algn="l" defTabSz="914400" rtl="0" eaLnBrk="1" latinLnBrk="0" hangingPunct="1">
+              <a:lnSpc>
+                <a:spcPct val="120000"/>
+              </a:lnSpc>
+              <a:spcBef>
+                <a:spcPts val="500"/>
+              </a:spcBef>
+              <a:buClr>
+                <a:schemeClr val="accent1"/>
+              </a:buClr>
+              <a:buSzPct val="100000"/>
+              <a:buFont typeface="Arial" panose="020B0604020202020204" pitchFamily="34" charset="0"/>
+              <a:buChar char="•"/>
+              <a:defRPr sz="1200" kern="1200">
+                <a:solidFill>
+                  <a:schemeClr val="tx1"/>
+                </a:solidFill>
+                <a:effectLst/>
+                <a:latin typeface="+mn-lt"/>
+                <a:ea typeface="+mn-ea"/>
+                <a:cs typeface="+mn-cs"/>
+              </a:defRPr>
+            </a:lvl6pPr>
+            <a:lvl7pPr marL="2971800" indent="-228600" algn="l" defTabSz="914400" rtl="0" eaLnBrk="1" latinLnBrk="0" hangingPunct="1">
+              <a:lnSpc>
+                <a:spcPct val="120000"/>
+              </a:lnSpc>
+              <a:spcBef>
+                <a:spcPts val="500"/>
+              </a:spcBef>
+              <a:buClr>
+                <a:schemeClr val="accent1"/>
+              </a:buClr>
+              <a:buSzPct val="100000"/>
+              <a:buFont typeface="Arial" panose="020B0604020202020204" pitchFamily="34" charset="0"/>
+              <a:buChar char="•"/>
+              <a:defRPr sz="1200" kern="1200">
+                <a:solidFill>
+                  <a:schemeClr val="tx1"/>
+                </a:solidFill>
+                <a:effectLst/>
+                <a:latin typeface="+mn-lt"/>
+                <a:ea typeface="+mn-ea"/>
+                <a:cs typeface="+mn-cs"/>
+              </a:defRPr>
+            </a:lvl7pPr>
+            <a:lvl8pPr marL="3429000" indent="-228600" algn="l" defTabSz="914400" rtl="0" eaLnBrk="1" latinLnBrk="0" hangingPunct="1">
+              <a:lnSpc>
+                <a:spcPct val="120000"/>
+              </a:lnSpc>
+              <a:spcBef>
+                <a:spcPts val="500"/>
+              </a:spcBef>
+              <a:buClr>
+                <a:schemeClr val="accent1"/>
+              </a:buClr>
+              <a:buSzPct val="100000"/>
+              <a:buFont typeface="Arial" panose="020B0604020202020204" pitchFamily="34" charset="0"/>
+              <a:buChar char="•"/>
+              <a:defRPr sz="1200" kern="1200" baseline="0">
+                <a:solidFill>
+                  <a:schemeClr val="tx1"/>
+                </a:solidFill>
+                <a:effectLst/>
+                <a:latin typeface="+mn-lt"/>
+                <a:ea typeface="+mn-ea"/>
+                <a:cs typeface="+mn-cs"/>
+              </a:defRPr>
+            </a:lvl8pPr>
+            <a:lvl9pPr marL="3886200" indent="-228600" algn="l" defTabSz="914400" rtl="0" eaLnBrk="1" latinLnBrk="0" hangingPunct="1">
+              <a:lnSpc>
+                <a:spcPct val="120000"/>
+              </a:lnSpc>
+              <a:spcBef>
+                <a:spcPts val="500"/>
+              </a:spcBef>
+              <a:buClr>
+                <a:schemeClr val="accent1"/>
+              </a:buClr>
+              <a:buSzPct val="100000"/>
+              <a:buFont typeface="Arial" panose="020B0604020202020204" pitchFamily="34" charset="0"/>
+              <a:buChar char="•"/>
+              <a:defRPr sz="1200" kern="1200" baseline="0">
+                <a:solidFill>
+                  <a:schemeClr val="tx1"/>
+                </a:solidFill>
+                <a:effectLst/>
+                <a:latin typeface="+mn-lt"/>
+                <a:ea typeface="+mn-ea"/>
+                <a:cs typeface="+mn-cs"/>
+              </a:defRPr>
+            </a:lvl9pPr>
+          </a:lstStyle>
+          <a:p>
+            <a:pPr marL="285750" indent="-285750"/>
+            <a:r>
+              <a:rPr lang="en-US" sz="1800" dirty="0"/>
+              <a:t>Handled the Maze</a:t>
+            </a:r>
+          </a:p>
+          <a:p>
+            <a:pPr marL="285750" indent="-285750"/>
+            <a:r>
+              <a:rPr lang="en-US" sz="1800" dirty="0"/>
+              <a:t>Worked on …</a:t>
+            </a:r>
+          </a:p>
+          <a:p>
+            <a:pPr marL="742950" lvl="1" indent="-285750"/>
+            <a:r>
+              <a:rPr lang="en-US" sz="1600" dirty="0"/>
+              <a:t>Random Maze Generator</a:t>
+            </a:r>
+          </a:p>
+          <a:p>
+            <a:pPr marL="742950" lvl="1" indent="-285750"/>
+            <a:r>
+              <a:rPr lang="en-US" sz="1600" dirty="0"/>
+              <a:t>Random Maze Solver</a:t>
+            </a:r>
+          </a:p>
+          <a:p>
+            <a:pPr marL="742950" lvl="1" indent="-285750"/>
+            <a:r>
+              <a:rPr lang="en-US" sz="1600" dirty="0"/>
+              <a:t>Maze features</a:t>
+            </a:r>
+          </a:p>
+          <a:p>
+            <a:pPr marL="1200150" lvl="2" indent="-285750"/>
+            <a:r>
+              <a:rPr lang="en-US" sz="1400" dirty="0"/>
+              <a:t>Holes</a:t>
+            </a:r>
+          </a:p>
+          <a:p>
+            <a:pPr marL="1200150" lvl="2" indent="-285750"/>
+            <a:r>
+              <a:rPr lang="en-US" sz="1400" dirty="0"/>
+              <a:t>Levels</a:t>
+            </a:r>
+          </a:p>
+          <a:p>
+            <a:pPr marL="1200150" lvl="2" indent="-285750"/>
+            <a:r>
+              <a:rPr lang="en-US" sz="1400" dirty="0"/>
+              <a:t>User perspective movement</a:t>
+            </a:r>
+          </a:p>
+        </p:txBody>
+      </p:sp>
+      <p:sp>
+        <p:nvSpPr>
+          <p:cNvPr id="19" name="Text Placeholder 5"/>
+          <p:cNvSpPr txBox="1">
+            <a:spLocks/>
+          </p:cNvSpPr>
+          <p:nvPr/>
+        </p:nvSpPr>
+        <p:spPr>
+          <a:xfrm>
+            <a:off x="4487593" y="1831212"/>
+            <a:ext cx="3200400" cy="576262"/>
+          </a:xfrm>
+          <a:prstGeom prst="rect">
+            <a:avLst/>
+          </a:prstGeom>
+        </p:spPr>
+        <p:txBody>
+          <a:bodyPr/>
+          <a:lstStyle>
+            <a:lvl1pPr marL="228600" indent="-228600" algn="l" defTabSz="914400" rtl="0" eaLnBrk="1" latinLnBrk="0" hangingPunct="1">
+              <a:lnSpc>
+                <a:spcPct val="120000"/>
+              </a:lnSpc>
+              <a:spcBef>
+                <a:spcPts val="1000"/>
+              </a:spcBef>
+              <a:buClr>
+                <a:schemeClr val="accent1"/>
+              </a:buClr>
+              <a:buSzPct val="100000"/>
+              <a:buFont typeface="Arial" panose="020B0604020202020204" pitchFamily="34" charset="0"/>
+              <a:buChar char="•"/>
+              <a:defRPr sz="2000" kern="1200">
+                <a:solidFill>
+                  <a:schemeClr val="tx1"/>
+                </a:solidFill>
+                <a:effectLst/>
+                <a:latin typeface="+mn-lt"/>
+                <a:ea typeface="+mn-ea"/>
+                <a:cs typeface="+mn-cs"/>
+              </a:defRPr>
+            </a:lvl1pPr>
+            <a:lvl2pPr marL="685800" indent="-228600" algn="l" defTabSz="914400" rtl="0" eaLnBrk="1" latinLnBrk="0" hangingPunct="1">
+              <a:lnSpc>
+                <a:spcPct val="120000"/>
+              </a:lnSpc>
+              <a:spcBef>
+                <a:spcPts val="500"/>
+              </a:spcBef>
+              <a:buClr>
+                <a:schemeClr val="accent1"/>
+              </a:buClr>
+              <a:buSzPct val="100000"/>
+              <a:buFont typeface="Arial" panose="020B0604020202020204" pitchFamily="34" charset="0"/>
+              <a:buChar char="•"/>
+              <a:defRPr sz="1800" kern="1200" cap="none" baseline="0">
+                <a:solidFill>
+                  <a:schemeClr val="tx1"/>
+                </a:solidFill>
+                <a:effectLst/>
+                <a:latin typeface="+mn-lt"/>
+                <a:ea typeface="+mn-ea"/>
+                <a:cs typeface="+mn-cs"/>
+              </a:defRPr>
+            </a:lvl2pPr>
+            <a:lvl3pPr marL="1143000" indent="-228600" algn="l" defTabSz="914400" rtl="0" eaLnBrk="1" latinLnBrk="0" hangingPunct="1">
+              <a:lnSpc>
+                <a:spcPct val="120000"/>
+              </a:lnSpc>
+              <a:spcBef>
+                <a:spcPts val="500"/>
+              </a:spcBef>
+              <a:buClr>
+                <a:schemeClr val="accent1"/>
+              </a:buClr>
+              <a:buSzPct val="100000"/>
+              <a:buFont typeface="Arial" panose="020B0604020202020204" pitchFamily="34" charset="0"/>
+              <a:buChar char="•"/>
+              <a:defRPr sz="1600" kern="1200">
+                <a:solidFill>
+                  <a:schemeClr val="tx1"/>
+                </a:solidFill>
+                <a:effectLst/>
+                <a:latin typeface="+mn-lt"/>
+                <a:ea typeface="+mn-ea"/>
+                <a:cs typeface="+mn-cs"/>
+              </a:defRPr>
+            </a:lvl3pPr>
+            <a:lvl4pPr marL="1600200" indent="-228600" algn="l" defTabSz="914400" rtl="0" eaLnBrk="1" latinLnBrk="0" hangingPunct="1">
+              <a:lnSpc>
+                <a:spcPct val="120000"/>
+              </a:lnSpc>
+              <a:spcBef>
+                <a:spcPts val="500"/>
+              </a:spcBef>
+              <a:buClr>
+                <a:schemeClr val="accent1"/>
+              </a:buClr>
+              <a:buSzPct val="100000"/>
+              <a:buFont typeface="Arial" panose="020B0604020202020204" pitchFamily="34" charset="0"/>
+              <a:buChar char="•"/>
+              <a:defRPr sz="1400" kern="1200" cap="none" baseline="0">
+                <a:solidFill>
+                  <a:schemeClr val="tx1"/>
+                </a:solidFill>
+                <a:effectLst/>
+                <a:latin typeface="+mn-lt"/>
+                <a:ea typeface="+mn-ea"/>
+                <a:cs typeface="+mn-cs"/>
+              </a:defRPr>
+            </a:lvl4pPr>
+            <a:lvl5pPr marL="2057400" indent="-228600" algn="l" defTabSz="914400" rtl="0" eaLnBrk="1" latinLnBrk="0" hangingPunct="1">
+              <a:lnSpc>
+                <a:spcPct val="120000"/>
+              </a:lnSpc>
+              <a:spcBef>
+                <a:spcPts val="500"/>
+              </a:spcBef>
+              <a:buClr>
+                <a:schemeClr val="accent1"/>
+              </a:buClr>
+              <a:buSzPct val="100000"/>
+              <a:buFont typeface="Arial" panose="020B0604020202020204" pitchFamily="34" charset="0"/>
+              <a:buChar char="•"/>
+              <a:defRPr sz="1200" kern="1200">
+                <a:solidFill>
+                  <a:schemeClr val="tx1"/>
+                </a:solidFill>
+                <a:effectLst/>
+                <a:latin typeface="+mn-lt"/>
+                <a:ea typeface="+mn-ea"/>
+                <a:cs typeface="+mn-cs"/>
+              </a:defRPr>
+            </a:lvl5pPr>
+            <a:lvl6pPr marL="2514600" indent="-228600" algn="l" defTabSz="914400" rtl="0" eaLnBrk="1" latinLnBrk="0" hangingPunct="1">
+              <a:lnSpc>
+                <a:spcPct val="120000"/>
+              </a:lnSpc>
+              <a:spcBef>
+                <a:spcPts val="500"/>
+              </a:spcBef>
+              <a:buClr>
+                <a:schemeClr val="accent1"/>
+              </a:buClr>
+              <a:buSzPct val="100000"/>
+              <a:buFont typeface="Arial" panose="020B0604020202020204" pitchFamily="34" charset="0"/>
+              <a:buChar char="•"/>
+              <a:defRPr sz="1200" kern="1200">
+                <a:solidFill>
+                  <a:schemeClr val="tx1"/>
+                </a:solidFill>
+                <a:effectLst/>
+                <a:latin typeface="+mn-lt"/>
+                <a:ea typeface="+mn-ea"/>
+                <a:cs typeface="+mn-cs"/>
+              </a:defRPr>
+            </a:lvl6pPr>
+            <a:lvl7pPr marL="2971800" indent="-228600" algn="l" defTabSz="914400" rtl="0" eaLnBrk="1" latinLnBrk="0" hangingPunct="1">
+              <a:lnSpc>
+                <a:spcPct val="120000"/>
+              </a:lnSpc>
+              <a:spcBef>
+                <a:spcPts val="500"/>
+              </a:spcBef>
+              <a:buClr>
+                <a:schemeClr val="accent1"/>
+              </a:buClr>
+              <a:buSzPct val="100000"/>
+              <a:buFont typeface="Arial" panose="020B0604020202020204" pitchFamily="34" charset="0"/>
+              <a:buChar char="•"/>
+              <a:defRPr sz="1200" kern="1200">
+                <a:solidFill>
+                  <a:schemeClr val="tx1"/>
+                </a:solidFill>
+                <a:effectLst/>
+                <a:latin typeface="+mn-lt"/>
+                <a:ea typeface="+mn-ea"/>
+                <a:cs typeface="+mn-cs"/>
+              </a:defRPr>
+            </a:lvl7pPr>
+            <a:lvl8pPr marL="3429000" indent="-228600" algn="l" defTabSz="914400" rtl="0" eaLnBrk="1" latinLnBrk="0" hangingPunct="1">
+              <a:lnSpc>
+                <a:spcPct val="120000"/>
+              </a:lnSpc>
+              <a:spcBef>
+                <a:spcPts val="500"/>
+              </a:spcBef>
+              <a:buClr>
+                <a:schemeClr val="accent1"/>
+              </a:buClr>
+              <a:buSzPct val="100000"/>
+              <a:buFont typeface="Arial" panose="020B0604020202020204" pitchFamily="34" charset="0"/>
+              <a:buChar char="•"/>
+              <a:defRPr sz="1200" kern="1200" baseline="0">
+                <a:solidFill>
+                  <a:schemeClr val="tx1"/>
+                </a:solidFill>
+                <a:effectLst/>
+                <a:latin typeface="+mn-lt"/>
+                <a:ea typeface="+mn-ea"/>
+                <a:cs typeface="+mn-cs"/>
+              </a:defRPr>
+            </a:lvl8pPr>
+            <a:lvl9pPr marL="3886200" indent="-228600" algn="l" defTabSz="914400" rtl="0" eaLnBrk="1" latinLnBrk="0" hangingPunct="1">
+              <a:lnSpc>
+                <a:spcPct val="120000"/>
+              </a:lnSpc>
+              <a:spcBef>
+                <a:spcPts val="500"/>
+              </a:spcBef>
+              <a:buClr>
+                <a:schemeClr val="accent1"/>
+              </a:buClr>
+              <a:buSzPct val="100000"/>
+              <a:buFont typeface="Arial" panose="020B0604020202020204" pitchFamily="34" charset="0"/>
+              <a:buChar char="•"/>
+              <a:defRPr sz="1200" kern="1200" baseline="0">
+                <a:solidFill>
+                  <a:schemeClr val="tx1"/>
+                </a:solidFill>
+                <a:effectLst/>
+                <a:latin typeface="+mn-lt"/>
+                <a:ea typeface="+mn-ea"/>
+                <a:cs typeface="+mn-cs"/>
+              </a:defRPr>
+            </a:lvl9pPr>
+          </a:lstStyle>
+          <a:p>
+            <a:pPr algn="ctr"/>
+            <a:r>
+              <a:rPr lang="en-US" sz="2400"/>
+              <a:t>Rebekah Manweiler</a:t>
+            </a:r>
+            <a:endParaRPr lang="en-US" sz="2400" dirty="0"/>
+          </a:p>
+        </p:txBody>
+      </p:sp>
+      <p:sp>
+        <p:nvSpPr>
+          <p:cNvPr id="20" name="Text Placeholder 9"/>
+          <p:cNvSpPr txBox="1">
+            <a:spLocks/>
+          </p:cNvSpPr>
+          <p:nvPr/>
+        </p:nvSpPr>
+        <p:spPr>
+          <a:xfrm>
+            <a:off x="4487593" y="2660468"/>
+            <a:ext cx="3200400" cy="3927565"/>
+          </a:xfrm>
+          <a:prstGeom prst="rect">
+            <a:avLst/>
+          </a:prstGeom>
+        </p:spPr>
+        <p:txBody>
+          <a:bodyPr>
+            <a:normAutofit/>
+          </a:bodyPr>
+          <a:lstStyle>
+            <a:lvl1pPr marL="228600" indent="-228600" algn="l" defTabSz="914400" rtl="0" eaLnBrk="1" latinLnBrk="0" hangingPunct="1">
+              <a:lnSpc>
+                <a:spcPct val="120000"/>
+              </a:lnSpc>
+              <a:spcBef>
+                <a:spcPts val="1000"/>
+              </a:spcBef>
+              <a:buClr>
+                <a:schemeClr val="accent1"/>
+              </a:buClr>
+              <a:buSzPct val="100000"/>
+              <a:buFont typeface="Arial" panose="020B0604020202020204" pitchFamily="34" charset="0"/>
+              <a:buChar char="•"/>
+              <a:defRPr sz="2000" kern="1200">
+                <a:solidFill>
+                  <a:schemeClr val="tx1"/>
+                </a:solidFill>
+                <a:effectLst/>
+                <a:latin typeface="+mn-lt"/>
+                <a:ea typeface="+mn-ea"/>
+                <a:cs typeface="+mn-cs"/>
+              </a:defRPr>
+            </a:lvl1pPr>
+            <a:lvl2pPr marL="685800" indent="-228600" algn="l" defTabSz="914400" rtl="0" eaLnBrk="1" latinLnBrk="0" hangingPunct="1">
+              <a:lnSpc>
+                <a:spcPct val="120000"/>
+              </a:lnSpc>
+              <a:spcBef>
+                <a:spcPts val="500"/>
+              </a:spcBef>
+              <a:buClr>
+                <a:schemeClr val="accent1"/>
+              </a:buClr>
+              <a:buSzPct val="100000"/>
+              <a:buFont typeface="Arial" panose="020B0604020202020204" pitchFamily="34" charset="0"/>
+              <a:buChar char="•"/>
+              <a:defRPr sz="1800" kern="1200" cap="none" baseline="0">
+                <a:solidFill>
+                  <a:schemeClr val="tx1"/>
+                </a:solidFill>
+                <a:effectLst/>
+                <a:latin typeface="+mn-lt"/>
+                <a:ea typeface="+mn-ea"/>
+                <a:cs typeface="+mn-cs"/>
+              </a:defRPr>
+            </a:lvl2pPr>
+            <a:lvl3pPr marL="1143000" indent="-228600" algn="l" defTabSz="914400" rtl="0" eaLnBrk="1" latinLnBrk="0" hangingPunct="1">
+              <a:lnSpc>
+                <a:spcPct val="120000"/>
+              </a:lnSpc>
+              <a:spcBef>
+                <a:spcPts val="500"/>
+              </a:spcBef>
+              <a:buClr>
+                <a:schemeClr val="accent1"/>
+              </a:buClr>
+              <a:buSzPct val="100000"/>
+              <a:buFont typeface="Arial" panose="020B0604020202020204" pitchFamily="34" charset="0"/>
+              <a:buChar char="•"/>
+              <a:defRPr sz="1600" kern="1200">
+                <a:solidFill>
+                  <a:schemeClr val="tx1"/>
+                </a:solidFill>
+                <a:effectLst/>
+                <a:latin typeface="+mn-lt"/>
+                <a:ea typeface="+mn-ea"/>
+                <a:cs typeface="+mn-cs"/>
+              </a:defRPr>
+            </a:lvl3pPr>
+            <a:lvl4pPr marL="1600200" indent="-228600" algn="l" defTabSz="914400" rtl="0" eaLnBrk="1" latinLnBrk="0" hangingPunct="1">
+              <a:lnSpc>
+                <a:spcPct val="120000"/>
+              </a:lnSpc>
+              <a:spcBef>
+                <a:spcPts val="500"/>
+              </a:spcBef>
+              <a:buClr>
+                <a:schemeClr val="accent1"/>
+              </a:buClr>
+              <a:buSzPct val="100000"/>
+              <a:buFont typeface="Arial" panose="020B0604020202020204" pitchFamily="34" charset="0"/>
+              <a:buChar char="•"/>
+              <a:defRPr sz="1400" kern="1200" cap="none" baseline="0">
+                <a:solidFill>
+                  <a:schemeClr val="tx1"/>
+                </a:solidFill>
+                <a:effectLst/>
+                <a:latin typeface="+mn-lt"/>
+                <a:ea typeface="+mn-ea"/>
+                <a:cs typeface="+mn-cs"/>
+              </a:defRPr>
+            </a:lvl4pPr>
+            <a:lvl5pPr marL="2057400" indent="-228600" algn="l" defTabSz="914400" rtl="0" eaLnBrk="1" latinLnBrk="0" hangingPunct="1">
+              <a:lnSpc>
+                <a:spcPct val="120000"/>
+              </a:lnSpc>
+              <a:spcBef>
+                <a:spcPts val="500"/>
+              </a:spcBef>
+              <a:buClr>
+                <a:schemeClr val="accent1"/>
+              </a:buClr>
+              <a:buSzPct val="100000"/>
+              <a:buFont typeface="Arial" panose="020B0604020202020204" pitchFamily="34" charset="0"/>
+              <a:buChar char="•"/>
+              <a:defRPr sz="1200" kern="1200">
+                <a:solidFill>
+                  <a:schemeClr val="tx1"/>
+                </a:solidFill>
+                <a:effectLst/>
+                <a:latin typeface="+mn-lt"/>
+                <a:ea typeface="+mn-ea"/>
+                <a:cs typeface="+mn-cs"/>
+              </a:defRPr>
+            </a:lvl5pPr>
+            <a:lvl6pPr marL="2514600" indent="-228600" algn="l" defTabSz="914400" rtl="0" eaLnBrk="1" latinLnBrk="0" hangingPunct="1">
+              <a:lnSpc>
+                <a:spcPct val="120000"/>
+              </a:lnSpc>
+              <a:spcBef>
+                <a:spcPts val="500"/>
+              </a:spcBef>
+              <a:buClr>
+                <a:schemeClr val="accent1"/>
+              </a:buClr>
+              <a:buSzPct val="100000"/>
+              <a:buFont typeface="Arial" panose="020B0604020202020204" pitchFamily="34" charset="0"/>
+              <a:buChar char="•"/>
+              <a:defRPr sz="1200" kern="1200">
+                <a:solidFill>
+                  <a:schemeClr val="tx1"/>
+                </a:solidFill>
+                <a:effectLst/>
+                <a:latin typeface="+mn-lt"/>
+                <a:ea typeface="+mn-ea"/>
+                <a:cs typeface="+mn-cs"/>
+              </a:defRPr>
+            </a:lvl6pPr>
+            <a:lvl7pPr marL="2971800" indent="-228600" algn="l" defTabSz="914400" rtl="0" eaLnBrk="1" latinLnBrk="0" hangingPunct="1">
+              <a:lnSpc>
+                <a:spcPct val="120000"/>
+              </a:lnSpc>
+              <a:spcBef>
+                <a:spcPts val="500"/>
+              </a:spcBef>
+              <a:buClr>
+                <a:schemeClr val="accent1"/>
+              </a:buClr>
+              <a:buSzPct val="100000"/>
+              <a:buFont typeface="Arial" panose="020B0604020202020204" pitchFamily="34" charset="0"/>
+              <a:buChar char="•"/>
+              <a:defRPr sz="1200" kern="1200">
+                <a:solidFill>
+                  <a:schemeClr val="tx1"/>
+                </a:solidFill>
+                <a:effectLst/>
+                <a:latin typeface="+mn-lt"/>
+                <a:ea typeface="+mn-ea"/>
+                <a:cs typeface="+mn-cs"/>
+              </a:defRPr>
+            </a:lvl7pPr>
+            <a:lvl8pPr marL="3429000" indent="-228600" algn="l" defTabSz="914400" rtl="0" eaLnBrk="1" latinLnBrk="0" hangingPunct="1">
+              <a:lnSpc>
+                <a:spcPct val="120000"/>
+              </a:lnSpc>
+              <a:spcBef>
+                <a:spcPts val="500"/>
+              </a:spcBef>
+              <a:buClr>
+                <a:schemeClr val="accent1"/>
+              </a:buClr>
+              <a:buSzPct val="100000"/>
+              <a:buFont typeface="Arial" panose="020B0604020202020204" pitchFamily="34" charset="0"/>
+              <a:buChar char="•"/>
+              <a:defRPr sz="1200" kern="1200" baseline="0">
+                <a:solidFill>
+                  <a:schemeClr val="tx1"/>
+                </a:solidFill>
+                <a:effectLst/>
+                <a:latin typeface="+mn-lt"/>
+                <a:ea typeface="+mn-ea"/>
+                <a:cs typeface="+mn-cs"/>
+              </a:defRPr>
+            </a:lvl8pPr>
+            <a:lvl9pPr marL="3886200" indent="-228600" algn="l" defTabSz="914400" rtl="0" eaLnBrk="1" latinLnBrk="0" hangingPunct="1">
+              <a:lnSpc>
+                <a:spcPct val="120000"/>
+              </a:lnSpc>
+              <a:spcBef>
+                <a:spcPts val="500"/>
+              </a:spcBef>
+              <a:buClr>
+                <a:schemeClr val="accent1"/>
+              </a:buClr>
+              <a:buSzPct val="100000"/>
+              <a:buFont typeface="Arial" panose="020B0604020202020204" pitchFamily="34" charset="0"/>
+              <a:buChar char="•"/>
+              <a:defRPr sz="1200" kern="1200" baseline="0">
+                <a:solidFill>
+                  <a:schemeClr val="tx1"/>
+                </a:solidFill>
+                <a:effectLst/>
+                <a:latin typeface="+mn-lt"/>
+                <a:ea typeface="+mn-ea"/>
+                <a:cs typeface="+mn-cs"/>
+              </a:defRPr>
+            </a:lvl9pPr>
+          </a:lstStyle>
+          <a:p>
+            <a:pPr marL="285750" indent="-285750"/>
+            <a:r>
+              <a:rPr lang="en-US" sz="1800" dirty="0"/>
+              <a:t>Handled the 3D Graphics</a:t>
+            </a:r>
+          </a:p>
+          <a:p>
+            <a:pPr marL="285750" indent="-285750"/>
+            <a:r>
+              <a:rPr lang="en-US" sz="1800" dirty="0"/>
+              <a:t>Worked on …</a:t>
+            </a:r>
+          </a:p>
+          <a:p>
+            <a:pPr marL="742950" lvl="1" indent="-285750"/>
+            <a:r>
+              <a:rPr lang="en-US" sz="1600" dirty="0"/>
+              <a:t>Code base testing</a:t>
+            </a:r>
+          </a:p>
+          <a:p>
+            <a:pPr marL="742950" lvl="1" indent="-285750"/>
+            <a:r>
+              <a:rPr lang="en-US" sz="1600" dirty="0"/>
+              <a:t>3D website generation</a:t>
+            </a:r>
+          </a:p>
+          <a:p>
+            <a:pPr marL="1200150" lvl="2" indent="-285750"/>
+            <a:r>
+              <a:rPr lang="en-US" sz="1400" dirty="0"/>
+              <a:t>Hosting website on GitHub</a:t>
+            </a:r>
+          </a:p>
+          <a:p>
+            <a:pPr marL="1200150" lvl="2" indent="-285750"/>
+            <a:r>
+              <a:rPr lang="en-US" sz="1400" dirty="0"/>
+              <a:t>3D Rendering </a:t>
+            </a:r>
+          </a:p>
+          <a:p>
+            <a:pPr marL="1200150" lvl="2" indent="-285750"/>
+            <a:r>
+              <a:rPr lang="en-US" sz="1400" dirty="0"/>
+              <a:t>Restricting movement</a:t>
+            </a:r>
+          </a:p>
+        </p:txBody>
+      </p:sp>
+      <p:sp>
+        <p:nvSpPr>
+          <p:cNvPr id="21" name="Text Placeholder 6"/>
+          <p:cNvSpPr txBox="1">
+            <a:spLocks/>
+          </p:cNvSpPr>
+          <p:nvPr/>
+        </p:nvSpPr>
+        <p:spPr>
+          <a:xfrm>
+            <a:off x="7852567" y="1831212"/>
+            <a:ext cx="3190741" cy="576262"/>
+          </a:xfrm>
+          <a:prstGeom prst="rect">
+            <a:avLst/>
+          </a:prstGeom>
+        </p:spPr>
+        <p:txBody>
+          <a:bodyPr/>
+          <a:lstStyle>
+            <a:lvl1pPr marL="228600" indent="-228600" algn="l" defTabSz="914400" rtl="0" eaLnBrk="1" latinLnBrk="0" hangingPunct="1">
+              <a:lnSpc>
+                <a:spcPct val="120000"/>
+              </a:lnSpc>
+              <a:spcBef>
+                <a:spcPts val="1000"/>
+              </a:spcBef>
+              <a:buClr>
+                <a:schemeClr val="accent1"/>
+              </a:buClr>
+              <a:buSzPct val="100000"/>
+              <a:buFont typeface="Arial" panose="020B0604020202020204" pitchFamily="34" charset="0"/>
+              <a:buChar char="•"/>
+              <a:defRPr sz="2000" kern="1200">
+                <a:solidFill>
+                  <a:schemeClr val="tx1"/>
+                </a:solidFill>
+                <a:effectLst/>
+                <a:latin typeface="+mn-lt"/>
+                <a:ea typeface="+mn-ea"/>
+                <a:cs typeface="+mn-cs"/>
+              </a:defRPr>
+            </a:lvl1pPr>
+            <a:lvl2pPr marL="685800" indent="-228600" algn="l" defTabSz="914400" rtl="0" eaLnBrk="1" latinLnBrk="0" hangingPunct="1">
+              <a:lnSpc>
+                <a:spcPct val="120000"/>
+              </a:lnSpc>
+              <a:spcBef>
+                <a:spcPts val="500"/>
+              </a:spcBef>
+              <a:buClr>
+                <a:schemeClr val="accent1"/>
+              </a:buClr>
+              <a:buSzPct val="100000"/>
+              <a:buFont typeface="Arial" panose="020B0604020202020204" pitchFamily="34" charset="0"/>
+              <a:buChar char="•"/>
+              <a:defRPr sz="1800" kern="1200" cap="none" baseline="0">
+                <a:solidFill>
+                  <a:schemeClr val="tx1"/>
+                </a:solidFill>
+                <a:effectLst/>
+                <a:latin typeface="+mn-lt"/>
+                <a:ea typeface="+mn-ea"/>
+                <a:cs typeface="+mn-cs"/>
+              </a:defRPr>
+            </a:lvl2pPr>
+            <a:lvl3pPr marL="1143000" indent="-228600" algn="l" defTabSz="914400" rtl="0" eaLnBrk="1" latinLnBrk="0" hangingPunct="1">
+              <a:lnSpc>
+                <a:spcPct val="120000"/>
+              </a:lnSpc>
+              <a:spcBef>
+                <a:spcPts val="500"/>
+              </a:spcBef>
+              <a:buClr>
+                <a:schemeClr val="accent1"/>
+              </a:buClr>
+              <a:buSzPct val="100000"/>
+              <a:buFont typeface="Arial" panose="020B0604020202020204" pitchFamily="34" charset="0"/>
+              <a:buChar char="•"/>
+              <a:defRPr sz="1600" kern="1200">
+                <a:solidFill>
+                  <a:schemeClr val="tx1"/>
+                </a:solidFill>
+                <a:effectLst/>
+                <a:latin typeface="+mn-lt"/>
+                <a:ea typeface="+mn-ea"/>
+                <a:cs typeface="+mn-cs"/>
+              </a:defRPr>
+            </a:lvl3pPr>
+            <a:lvl4pPr marL="1600200" indent="-228600" algn="l" defTabSz="914400" rtl="0" eaLnBrk="1" latinLnBrk="0" hangingPunct="1">
+              <a:lnSpc>
+                <a:spcPct val="120000"/>
+              </a:lnSpc>
+              <a:spcBef>
+                <a:spcPts val="500"/>
+              </a:spcBef>
+              <a:buClr>
+                <a:schemeClr val="accent1"/>
+              </a:buClr>
+              <a:buSzPct val="100000"/>
+              <a:buFont typeface="Arial" panose="020B0604020202020204" pitchFamily="34" charset="0"/>
+              <a:buChar char="•"/>
+              <a:defRPr sz="1400" kern="1200" cap="none" baseline="0">
+                <a:solidFill>
+                  <a:schemeClr val="tx1"/>
+                </a:solidFill>
+                <a:effectLst/>
+                <a:latin typeface="+mn-lt"/>
+                <a:ea typeface="+mn-ea"/>
+                <a:cs typeface="+mn-cs"/>
+              </a:defRPr>
+            </a:lvl4pPr>
+            <a:lvl5pPr marL="2057400" indent="-228600" algn="l" defTabSz="914400" rtl="0" eaLnBrk="1" latinLnBrk="0" hangingPunct="1">
+              <a:lnSpc>
+                <a:spcPct val="120000"/>
+              </a:lnSpc>
+              <a:spcBef>
+                <a:spcPts val="500"/>
+              </a:spcBef>
+              <a:buClr>
+                <a:schemeClr val="accent1"/>
+              </a:buClr>
+              <a:buSzPct val="100000"/>
+              <a:buFont typeface="Arial" panose="020B0604020202020204" pitchFamily="34" charset="0"/>
+              <a:buChar char="•"/>
+              <a:defRPr sz="1200" kern="1200">
+                <a:solidFill>
+                  <a:schemeClr val="tx1"/>
+                </a:solidFill>
+                <a:effectLst/>
+                <a:latin typeface="+mn-lt"/>
+                <a:ea typeface="+mn-ea"/>
+                <a:cs typeface="+mn-cs"/>
+              </a:defRPr>
+            </a:lvl5pPr>
+            <a:lvl6pPr marL="2514600" indent="-228600" algn="l" defTabSz="914400" rtl="0" eaLnBrk="1" latinLnBrk="0" hangingPunct="1">
+              <a:lnSpc>
+                <a:spcPct val="120000"/>
+              </a:lnSpc>
+              <a:spcBef>
+                <a:spcPts val="500"/>
+              </a:spcBef>
+              <a:buClr>
+                <a:schemeClr val="accent1"/>
+              </a:buClr>
+              <a:buSzPct val="100000"/>
+              <a:buFont typeface="Arial" panose="020B0604020202020204" pitchFamily="34" charset="0"/>
+              <a:buChar char="•"/>
+              <a:defRPr sz="1200" kern="1200">
+                <a:solidFill>
+                  <a:schemeClr val="tx1"/>
+                </a:solidFill>
+                <a:effectLst/>
+                <a:latin typeface="+mn-lt"/>
+                <a:ea typeface="+mn-ea"/>
+                <a:cs typeface="+mn-cs"/>
+              </a:defRPr>
+            </a:lvl6pPr>
+            <a:lvl7pPr marL="2971800" indent="-228600" algn="l" defTabSz="914400" rtl="0" eaLnBrk="1" latinLnBrk="0" hangingPunct="1">
+              <a:lnSpc>
+                <a:spcPct val="120000"/>
+              </a:lnSpc>
+              <a:spcBef>
+                <a:spcPts val="500"/>
+              </a:spcBef>
+              <a:buClr>
+                <a:schemeClr val="accent1"/>
+              </a:buClr>
+              <a:buSzPct val="100000"/>
+              <a:buFont typeface="Arial" panose="020B0604020202020204" pitchFamily="34" charset="0"/>
+              <a:buChar char="•"/>
+              <a:defRPr sz="1200" kern="1200">
+                <a:solidFill>
+                  <a:schemeClr val="tx1"/>
+                </a:solidFill>
+                <a:effectLst/>
+                <a:latin typeface="+mn-lt"/>
+                <a:ea typeface="+mn-ea"/>
+                <a:cs typeface="+mn-cs"/>
+              </a:defRPr>
+            </a:lvl7pPr>
+            <a:lvl8pPr marL="3429000" indent="-228600" algn="l" defTabSz="914400" rtl="0" eaLnBrk="1" latinLnBrk="0" hangingPunct="1">
+              <a:lnSpc>
+                <a:spcPct val="120000"/>
+              </a:lnSpc>
+              <a:spcBef>
+                <a:spcPts val="500"/>
+              </a:spcBef>
+              <a:buClr>
+                <a:schemeClr val="accent1"/>
+              </a:buClr>
+              <a:buSzPct val="100000"/>
+              <a:buFont typeface="Arial" panose="020B0604020202020204" pitchFamily="34" charset="0"/>
+              <a:buChar char="•"/>
+              <a:defRPr sz="1200" kern="1200" baseline="0">
+                <a:solidFill>
+                  <a:schemeClr val="tx1"/>
+                </a:solidFill>
+                <a:effectLst/>
+                <a:latin typeface="+mn-lt"/>
+                <a:ea typeface="+mn-ea"/>
+                <a:cs typeface="+mn-cs"/>
+              </a:defRPr>
+            </a:lvl8pPr>
+            <a:lvl9pPr marL="3886200" indent="-228600" algn="l" defTabSz="914400" rtl="0" eaLnBrk="1" latinLnBrk="0" hangingPunct="1">
+              <a:lnSpc>
+                <a:spcPct val="120000"/>
+              </a:lnSpc>
+              <a:spcBef>
+                <a:spcPts val="500"/>
+              </a:spcBef>
+              <a:buClr>
+                <a:schemeClr val="accent1"/>
+              </a:buClr>
+              <a:buSzPct val="100000"/>
+              <a:buFont typeface="Arial" panose="020B0604020202020204" pitchFamily="34" charset="0"/>
+              <a:buChar char="•"/>
+              <a:defRPr sz="1200" kern="1200" baseline="0">
+                <a:solidFill>
+                  <a:schemeClr val="tx1"/>
+                </a:solidFill>
+                <a:effectLst/>
+                <a:latin typeface="+mn-lt"/>
+                <a:ea typeface="+mn-ea"/>
+                <a:cs typeface="+mn-cs"/>
+              </a:defRPr>
+            </a:lvl9pPr>
+          </a:lstStyle>
+          <a:p>
+            <a:pPr algn="ctr"/>
+            <a:r>
+              <a:rPr lang="en-US" sz="2800"/>
+              <a:t>Shawn parkes</a:t>
+            </a:r>
+            <a:endParaRPr lang="en-US" sz="2800" dirty="0"/>
+          </a:p>
+        </p:txBody>
+      </p:sp>
+      <p:sp>
+        <p:nvSpPr>
+          <p:cNvPr id="22" name="Text Placeholder 10"/>
+          <p:cNvSpPr txBox="1">
+            <a:spLocks/>
+          </p:cNvSpPr>
+          <p:nvPr/>
+        </p:nvSpPr>
+        <p:spPr>
+          <a:xfrm>
+            <a:off x="7838810" y="2676678"/>
+            <a:ext cx="3194968" cy="3927565"/>
+          </a:xfrm>
+          <a:prstGeom prst="rect">
+            <a:avLst/>
+          </a:prstGeom>
+        </p:spPr>
+        <p:txBody>
+          <a:bodyPr/>
+          <a:lstStyle>
+            <a:lvl1pPr marL="228600" indent="-228600" algn="l" defTabSz="914400" rtl="0" eaLnBrk="1" latinLnBrk="0" hangingPunct="1">
+              <a:lnSpc>
+                <a:spcPct val="120000"/>
+              </a:lnSpc>
+              <a:spcBef>
+                <a:spcPts val="1000"/>
+              </a:spcBef>
+              <a:buClr>
+                <a:schemeClr val="accent1"/>
+              </a:buClr>
+              <a:buSzPct val="100000"/>
+              <a:buFont typeface="Arial" panose="020B0604020202020204" pitchFamily="34" charset="0"/>
+              <a:buChar char="•"/>
+              <a:defRPr sz="2000" kern="1200">
+                <a:solidFill>
+                  <a:schemeClr val="tx1"/>
+                </a:solidFill>
+                <a:effectLst/>
+                <a:latin typeface="+mn-lt"/>
+                <a:ea typeface="+mn-ea"/>
+                <a:cs typeface="+mn-cs"/>
+              </a:defRPr>
+            </a:lvl1pPr>
+            <a:lvl2pPr marL="685800" indent="-228600" algn="l" defTabSz="914400" rtl="0" eaLnBrk="1" latinLnBrk="0" hangingPunct="1">
+              <a:lnSpc>
+                <a:spcPct val="120000"/>
+              </a:lnSpc>
+              <a:spcBef>
+                <a:spcPts val="500"/>
+              </a:spcBef>
+              <a:buClr>
+                <a:schemeClr val="accent1"/>
+              </a:buClr>
+              <a:buSzPct val="100000"/>
+              <a:buFont typeface="Arial" panose="020B0604020202020204" pitchFamily="34" charset="0"/>
+              <a:buChar char="•"/>
+              <a:defRPr sz="1800" kern="1200" cap="none" baseline="0">
+                <a:solidFill>
+                  <a:schemeClr val="tx1"/>
+                </a:solidFill>
+                <a:effectLst/>
+                <a:latin typeface="+mn-lt"/>
+                <a:ea typeface="+mn-ea"/>
+                <a:cs typeface="+mn-cs"/>
+              </a:defRPr>
+            </a:lvl2pPr>
+            <a:lvl3pPr marL="1143000" indent="-228600" algn="l" defTabSz="914400" rtl="0" eaLnBrk="1" latinLnBrk="0" hangingPunct="1">
+              <a:lnSpc>
+                <a:spcPct val="120000"/>
+              </a:lnSpc>
+              <a:spcBef>
+                <a:spcPts val="500"/>
+              </a:spcBef>
+              <a:buClr>
+                <a:schemeClr val="accent1"/>
+              </a:buClr>
+              <a:buSzPct val="100000"/>
+              <a:buFont typeface="Arial" panose="020B0604020202020204" pitchFamily="34" charset="0"/>
+              <a:buChar char="•"/>
+              <a:defRPr sz="1600" kern="1200">
+                <a:solidFill>
+                  <a:schemeClr val="tx1"/>
+                </a:solidFill>
+                <a:effectLst/>
+                <a:latin typeface="+mn-lt"/>
+                <a:ea typeface="+mn-ea"/>
+                <a:cs typeface="+mn-cs"/>
+              </a:defRPr>
+            </a:lvl3pPr>
+            <a:lvl4pPr marL="1600200" indent="-228600" algn="l" defTabSz="914400" rtl="0" eaLnBrk="1" latinLnBrk="0" hangingPunct="1">
+              <a:lnSpc>
+                <a:spcPct val="120000"/>
+              </a:lnSpc>
+              <a:spcBef>
+                <a:spcPts val="500"/>
+              </a:spcBef>
+              <a:buClr>
+                <a:schemeClr val="accent1"/>
+              </a:buClr>
+              <a:buSzPct val="100000"/>
+              <a:buFont typeface="Arial" panose="020B0604020202020204" pitchFamily="34" charset="0"/>
+              <a:buChar char="•"/>
+              <a:defRPr sz="1400" kern="1200" cap="none" baseline="0">
+                <a:solidFill>
+                  <a:schemeClr val="tx1"/>
+                </a:solidFill>
+                <a:effectLst/>
+                <a:latin typeface="+mn-lt"/>
+                <a:ea typeface="+mn-ea"/>
+                <a:cs typeface="+mn-cs"/>
+              </a:defRPr>
+            </a:lvl4pPr>
+            <a:lvl5pPr marL="2057400" indent="-228600" algn="l" defTabSz="914400" rtl="0" eaLnBrk="1" latinLnBrk="0" hangingPunct="1">
+              <a:lnSpc>
+                <a:spcPct val="120000"/>
+              </a:lnSpc>
+              <a:spcBef>
+                <a:spcPts val="500"/>
+              </a:spcBef>
+              <a:buClr>
+                <a:schemeClr val="accent1"/>
+              </a:buClr>
+              <a:buSzPct val="100000"/>
+              <a:buFont typeface="Arial" panose="020B0604020202020204" pitchFamily="34" charset="0"/>
+              <a:buChar char="•"/>
+              <a:defRPr sz="1200" kern="1200">
+                <a:solidFill>
+                  <a:schemeClr val="tx1"/>
+                </a:solidFill>
+                <a:effectLst/>
+                <a:latin typeface="+mn-lt"/>
+                <a:ea typeface="+mn-ea"/>
+                <a:cs typeface="+mn-cs"/>
+              </a:defRPr>
+            </a:lvl5pPr>
+            <a:lvl6pPr marL="2514600" indent="-228600" algn="l" defTabSz="914400" rtl="0" eaLnBrk="1" latinLnBrk="0" hangingPunct="1">
+              <a:lnSpc>
+                <a:spcPct val="120000"/>
+              </a:lnSpc>
+              <a:spcBef>
+                <a:spcPts val="500"/>
+              </a:spcBef>
+              <a:buClr>
+                <a:schemeClr val="accent1"/>
+              </a:buClr>
+              <a:buSzPct val="100000"/>
+              <a:buFont typeface="Arial" panose="020B0604020202020204" pitchFamily="34" charset="0"/>
+              <a:buChar char="•"/>
+              <a:defRPr sz="1200" kern="1200">
+                <a:solidFill>
+                  <a:schemeClr val="tx1"/>
+                </a:solidFill>
+                <a:effectLst/>
+                <a:latin typeface="+mn-lt"/>
+                <a:ea typeface="+mn-ea"/>
+                <a:cs typeface="+mn-cs"/>
+              </a:defRPr>
+            </a:lvl6pPr>
+            <a:lvl7pPr marL="2971800" indent="-228600" algn="l" defTabSz="914400" rtl="0" eaLnBrk="1" latinLnBrk="0" hangingPunct="1">
+              <a:lnSpc>
+                <a:spcPct val="120000"/>
+              </a:lnSpc>
+              <a:spcBef>
+                <a:spcPts val="500"/>
+              </a:spcBef>
+              <a:buClr>
+                <a:schemeClr val="accent1"/>
+              </a:buClr>
+              <a:buSzPct val="100000"/>
+              <a:buFont typeface="Arial" panose="020B0604020202020204" pitchFamily="34" charset="0"/>
+              <a:buChar char="•"/>
+              <a:defRPr sz="1200" kern="1200">
+                <a:solidFill>
+                  <a:schemeClr val="tx1"/>
+                </a:solidFill>
+                <a:effectLst/>
+                <a:latin typeface="+mn-lt"/>
+                <a:ea typeface="+mn-ea"/>
+                <a:cs typeface="+mn-cs"/>
+              </a:defRPr>
+            </a:lvl7pPr>
+            <a:lvl8pPr marL="3429000" indent="-228600" algn="l" defTabSz="914400" rtl="0" eaLnBrk="1" latinLnBrk="0" hangingPunct="1">
+              <a:lnSpc>
+                <a:spcPct val="120000"/>
+              </a:lnSpc>
+              <a:spcBef>
+                <a:spcPts val="500"/>
+              </a:spcBef>
+              <a:buClr>
+                <a:schemeClr val="accent1"/>
+              </a:buClr>
+              <a:buSzPct val="100000"/>
+              <a:buFont typeface="Arial" panose="020B0604020202020204" pitchFamily="34" charset="0"/>
+              <a:buChar char="•"/>
+              <a:defRPr sz="1200" kern="1200" baseline="0">
+                <a:solidFill>
+                  <a:schemeClr val="tx1"/>
+                </a:solidFill>
+                <a:effectLst/>
+                <a:latin typeface="+mn-lt"/>
+                <a:ea typeface="+mn-ea"/>
+                <a:cs typeface="+mn-cs"/>
+              </a:defRPr>
+            </a:lvl8pPr>
+            <a:lvl9pPr marL="3886200" indent="-228600" algn="l" defTabSz="914400" rtl="0" eaLnBrk="1" latinLnBrk="0" hangingPunct="1">
+              <a:lnSpc>
+                <a:spcPct val="120000"/>
+              </a:lnSpc>
+              <a:spcBef>
+                <a:spcPts val="500"/>
+              </a:spcBef>
+              <a:buClr>
+                <a:schemeClr val="accent1"/>
+              </a:buClr>
+              <a:buSzPct val="100000"/>
+              <a:buFont typeface="Arial" panose="020B0604020202020204" pitchFamily="34" charset="0"/>
+              <a:buChar char="•"/>
+              <a:defRPr sz="1200" kern="1200" baseline="0">
+                <a:solidFill>
+                  <a:schemeClr val="tx1"/>
+                </a:solidFill>
+                <a:effectLst/>
+                <a:latin typeface="+mn-lt"/>
+                <a:ea typeface="+mn-ea"/>
+                <a:cs typeface="+mn-cs"/>
+              </a:defRPr>
+            </a:lvl9pPr>
+          </a:lstStyle>
+          <a:p>
+            <a:pPr marL="285750" indent="-285750"/>
+            <a:r>
+              <a:rPr lang="en-US" sz="1800" dirty="0"/>
+              <a:t>Handled the 2D Graphics</a:t>
+            </a:r>
+          </a:p>
+          <a:p>
+            <a:pPr marL="285750" indent="-285750"/>
+            <a:r>
+              <a:rPr lang="en-US" sz="1800" dirty="0"/>
+              <a:t>Worked on …</a:t>
+            </a:r>
+          </a:p>
+          <a:p>
+            <a:pPr marL="742950" lvl="1" indent="-285750"/>
+            <a:r>
+              <a:rPr lang="en-US" sz="1600" dirty="0"/>
+              <a:t>2D display on website</a:t>
+            </a:r>
+          </a:p>
+          <a:p>
+            <a:pPr marL="1200150" lvl="2" indent="-285750"/>
+            <a:r>
+              <a:rPr lang="en-US" sz="1400" dirty="0"/>
+              <a:t>Canvas </a:t>
+            </a:r>
+          </a:p>
+          <a:p>
+            <a:pPr marL="1200150" lvl="2" indent="-285750"/>
+            <a:r>
+              <a:rPr lang="en-US" sz="1400" dirty="0"/>
+              <a:t>Components</a:t>
+            </a:r>
+          </a:p>
+          <a:p>
+            <a:pPr marL="742950" lvl="1" indent="-285750"/>
+            <a:r>
+              <a:rPr lang="en-US" sz="1400" dirty="0"/>
+              <a:t>Player motion in display</a:t>
+            </a:r>
+          </a:p>
+          <a:p>
+            <a:pPr marL="1200150" lvl="2" indent="-285750"/>
+            <a:r>
+              <a:rPr lang="en-US" sz="1200" dirty="0"/>
+              <a:t>Key commands</a:t>
+            </a:r>
+          </a:p>
+          <a:p>
+            <a:pPr marL="1200150" lvl="2" indent="-285750"/>
+            <a:r>
+              <a:rPr lang="en-US" sz="1200" dirty="0"/>
+              <a:t>Restrictions</a:t>
+            </a:r>
+          </a:p>
+          <a:p>
+            <a:pPr marL="742950" lvl="1" indent="-285750"/>
+            <a:r>
+              <a:rPr lang="en-US" sz="1400" dirty="0"/>
+              <a:t>Maze generation in the grid</a:t>
+            </a:r>
+          </a:p>
+          <a:p>
+            <a:pPr marL="742950" lvl="1" indent="-285750"/>
+            <a:endParaRPr lang="en-US" dirty="0"/>
+          </a:p>
+        </p:txBody>
+      </p:sp>
+    </p:spTree>
+    <p:extLst>
+      <p:ext uri="{BB962C8B-B14F-4D97-AF65-F5344CB8AC3E}">
+        <p14:creationId xmlns:p14="http://schemas.microsoft.com/office/powerpoint/2010/main" val="3138629806"/>
+      </p:ext>
+    </p:extLst>
+  </p:cSld>
+  <p:clrMapOvr>
+    <a:masterClrMapping/>
+  </p:clrMapOvr>
+</p:sld>
+</file>
+
+<file path=ppt/slides/slide7.xml><?xml version="1.0" encoding="utf-8"?>
+<p:sld xmlns:a="http://schemas.openxmlformats.org/drawingml/2006/main" xmlns:r="http://schemas.openxmlformats.org/officeDocument/2006/relationships" xmlns:p="http://schemas.openxmlformats.org/presentationml/2006/main">
+  <p:cSld>
+    <p:spTree>
+      <p:nvGrpSpPr>
+        <p:cNvPr id="1" name=""/>
+        <p:cNvGrpSpPr/>
+        <p:nvPr/>
+      </p:nvGrpSpPr>
+      <p:grpSpPr>
+        <a:xfrm>
+          <a:off x="0" y="0"/>
+          <a:ext cx="0" cy="0"/>
+          <a:chOff x="0" y="0"/>
+          <a:chExt cx="0" cy="0"/>
+        </a:xfrm>
+      </p:grpSpPr>
+      <p:sp>
+        <p:nvSpPr>
+          <p:cNvPr id="2" name="Title 1"/>
+          <p:cNvSpPr>
+            <a:spLocks noGrp="1"/>
+          </p:cNvSpPr>
+          <p:nvPr>
+            <p:ph type="title"/>
+          </p:nvPr>
+        </p:nvSpPr>
+        <p:spPr/>
+        <p:txBody>
+          <a:bodyPr/>
+          <a:lstStyle/>
+          <a:p>
+            <a:r>
+              <a:rPr lang="en-US" dirty="0"/>
+              <a:t>Features – 2D prototype</a:t>
+            </a:r>
+          </a:p>
+        </p:txBody>
+      </p:sp>
+      <p:sp>
+        <p:nvSpPr>
+          <p:cNvPr id="3" name="Content Placeholder 2"/>
+          <p:cNvSpPr>
+            <a:spLocks noGrp="1"/>
+          </p:cNvSpPr>
+          <p:nvPr>
+            <p:ph idx="1"/>
+          </p:nvPr>
+        </p:nvSpPr>
+        <p:spPr/>
+        <p:txBody>
+          <a:bodyPr/>
+          <a:lstStyle/>
+          <a:p>
+            <a:endParaRPr lang="en-US" dirty="0"/>
+          </a:p>
+        </p:txBody>
+      </p:sp>
+    </p:spTree>
+    <p:extLst>
+      <p:ext uri="{BB962C8B-B14F-4D97-AF65-F5344CB8AC3E}">
+        <p14:creationId xmlns:p14="http://schemas.microsoft.com/office/powerpoint/2010/main" val="2772733768"/>
+      </p:ext>
+    </p:extLst>
+  </p:cSld>
+  <p:clrMapOvr>
+    <a:masterClrMapping/>
+  </p:clrMapOvr>
+</p:sld>
+</file>
+
+<file path=ppt/slides/slide8.xml><?xml version="1.0" encoding="utf-8"?>
+<p:sld xmlns:a="http://schemas.openxmlformats.org/drawingml/2006/main" xmlns:r="http://schemas.openxmlformats.org/officeDocument/2006/relationships" xmlns:p="http://schemas.openxmlformats.org/presentationml/2006/main">
+  <p:cSld>
+    <p:spTree>
+      <p:nvGrpSpPr>
+        <p:cNvPr id="1" name=""/>
+        <p:cNvGrpSpPr/>
+        <p:nvPr/>
+      </p:nvGrpSpPr>
+      <p:grpSpPr>
+        <a:xfrm>
+          <a:off x="0" y="0"/>
+          <a:ext cx="0" cy="0"/>
+          <a:chOff x="0" y="0"/>
+          <a:chExt cx="0" cy="0"/>
+        </a:xfrm>
+      </p:grpSpPr>
+      <p:sp>
+        <p:nvSpPr>
+          <p:cNvPr id="2" name="Title 1"/>
+          <p:cNvSpPr>
+            <a:spLocks noGrp="1"/>
+          </p:cNvSpPr>
+          <p:nvPr>
+            <p:ph type="title"/>
+          </p:nvPr>
+        </p:nvSpPr>
+        <p:spPr/>
+        <p:txBody>
+          <a:bodyPr/>
+          <a:lstStyle/>
+          <a:p>
+            <a:r>
+              <a:rPr lang="en-US" dirty="0"/>
+              <a:t>Features – 3d Prototypes</a:t>
+            </a:r>
+          </a:p>
+        </p:txBody>
+      </p:sp>
+      <p:sp>
+        <p:nvSpPr>
+          <p:cNvPr id="3" name="Content Placeholder 2"/>
+          <p:cNvSpPr>
+            <a:spLocks noGrp="1"/>
+          </p:cNvSpPr>
+          <p:nvPr>
+            <p:ph idx="1"/>
+          </p:nvPr>
+        </p:nvSpPr>
+        <p:spPr/>
+        <p:txBody>
+          <a:bodyPr>
+            <a:normAutofit fontScale="85000" lnSpcReduction="20000"/>
+          </a:bodyPr>
+          <a:lstStyle/>
+          <a:p>
+            <a:r>
+              <a:rPr lang="en-US" sz="1800" dirty="0"/>
+              <a:t>Started with three.js</a:t>
+            </a:r>
+          </a:p>
+          <a:p>
+            <a:pPr lvl="1"/>
+            <a:r>
+              <a:rPr lang="en-US" sz="1600" dirty="0"/>
+              <a:t>Downloaded a wamp server to test 3D pages initially</a:t>
+            </a:r>
+          </a:p>
+          <a:p>
+            <a:pPr lvl="1"/>
+            <a:r>
+              <a:rPr lang="en-US" sz="1600" dirty="0"/>
+              <a:t>Later, learned how to host the pages on GitHub</a:t>
+            </a:r>
+          </a:p>
+          <a:p>
+            <a:pPr lvl="1"/>
+            <a:r>
+              <a:rPr lang="en-US" sz="1600" dirty="0"/>
+              <a:t>Used a Minecraft example from the public three.js library</a:t>
+            </a:r>
+          </a:p>
+          <a:p>
+            <a:pPr lvl="2"/>
+            <a:r>
+              <a:rPr lang="en-US" sz="1400" dirty="0"/>
+              <a:t>Edited the example so that the user (the camera) could not look vertically, and could only move on top of the horizontal plane</a:t>
+            </a:r>
+          </a:p>
+          <a:p>
+            <a:pPr lvl="2"/>
+            <a:r>
+              <a:rPr lang="en-US" sz="1400" dirty="0"/>
+              <a:t>Researched various methods of collisions so that the player could not move through the random blocks on the plane, solutions found were very complicated</a:t>
+            </a:r>
+          </a:p>
+          <a:p>
+            <a:r>
+              <a:rPr lang="en-US" sz="1800" dirty="0"/>
+              <a:t>Stephen found Babylon</a:t>
+            </a:r>
+          </a:p>
+          <a:p>
+            <a:pPr lvl="1"/>
+            <a:r>
+              <a:rPr lang="en-US" sz="1600" dirty="0"/>
+              <a:t>Used their playground to test code</a:t>
+            </a:r>
+          </a:p>
+          <a:p>
+            <a:pPr lvl="2"/>
+            <a:r>
+              <a:rPr lang="en-US" sz="1400" dirty="0"/>
+              <a:t>Had built in collision so the player could not move through walls</a:t>
+            </a:r>
+          </a:p>
+          <a:p>
+            <a:pPr lvl="2"/>
+            <a:r>
+              <a:rPr lang="en-US" sz="1400" dirty="0"/>
+              <a:t>Created walls (cubes) with an array and empty indexes became passageways (once they were wide enough)</a:t>
+            </a:r>
+          </a:p>
+          <a:p>
+            <a:pPr lvl="2"/>
+            <a:r>
+              <a:rPr lang="en-US" sz="1400" dirty="0"/>
+              <a:t>Placed the user (camera) inside the walls </a:t>
+            </a:r>
+          </a:p>
+          <a:p>
+            <a:pPr lvl="2"/>
+            <a:r>
+              <a:rPr lang="en-US" sz="1400" dirty="0"/>
+              <a:t>Used predefined textures from Babylon</a:t>
+            </a:r>
+          </a:p>
+        </p:txBody>
+      </p:sp>
+    </p:spTree>
+    <p:extLst>
+      <p:ext uri="{BB962C8B-B14F-4D97-AF65-F5344CB8AC3E}">
+        <p14:creationId xmlns:p14="http://schemas.microsoft.com/office/powerpoint/2010/main" val="3684375584"/>
+      </p:ext>
+    </p:extLst>
+  </p:cSld>
+  <p:clrMapOvr>
+    <a:masterClrMapping/>
+  </p:clrMapOvr>
+</p:sld>
+</file>
+
+<file path=ppt/slides/slide9.xml><?xml version="1.0" encoding="utf-8"?>
+<p:sld xmlns:a="http://schemas.openxmlformats.org/drawingml/2006/main" xmlns:r="http://schemas.openxmlformats.org/officeDocument/2006/relationships" xmlns:p="http://schemas.openxmlformats.org/presentationml/2006/main">
+  <p:cSld>
+    <p:spTree>
+      <p:nvGrpSpPr>
+        <p:cNvPr id="1" name=""/>
+        <p:cNvGrpSpPr/>
+        <p:nvPr/>
+      </p:nvGrpSpPr>
+      <p:grpSpPr>
+        <a:xfrm>
+          <a:off x="0" y="0"/>
+          <a:ext cx="0" cy="0"/>
+          <a:chOff x="0" y="0"/>
+          <a:chExt cx="0" cy="0"/>
+        </a:xfrm>
+      </p:grpSpPr>
+      <p:sp>
+        <p:nvSpPr>
+          <p:cNvPr id="2" name="Title 1"/>
+          <p:cNvSpPr>
+            <a:spLocks noGrp="1"/>
+          </p:cNvSpPr>
+          <p:nvPr>
+            <p:ph type="title"/>
+          </p:nvPr>
+        </p:nvSpPr>
+        <p:spPr/>
+        <p:txBody>
+          <a:bodyPr/>
+          <a:lstStyle/>
+          <a:p>
+            <a:r>
+              <a:rPr lang="en-US" dirty="0"/>
+              <a:t>Project retrospect</a:t>
+            </a:r>
+          </a:p>
+        </p:txBody>
+      </p:sp>
+      <p:sp>
+        <p:nvSpPr>
+          <p:cNvPr id="3" name="Content Placeholder 2"/>
+          <p:cNvSpPr>
+            <a:spLocks noGrp="1"/>
+          </p:cNvSpPr>
+          <p:nvPr>
+            <p:ph idx="1"/>
+          </p:nvPr>
+        </p:nvSpPr>
+        <p:spPr/>
+        <p:txBody>
+          <a:bodyPr/>
+          <a:lstStyle/>
+          <a:p>
+            <a:r>
+              <a:rPr lang="en-US" dirty="0"/>
+              <a:t>We took advantage of the Gantt chart for planning, but left the rest of the documentation until the end, when we should have used the UML and scrum artifacts to better organize ourselves and our code.</a:t>
+            </a:r>
+          </a:p>
+          <a:p>
+            <a:r>
+              <a:rPr lang="en-US" dirty="0"/>
+              <a:t>The 2D maze game is fun and it shows how the 3D game will eventually work, but most of the 2D code will be useless in the 3D game.</a:t>
+            </a:r>
+          </a:p>
+          <a:p>
+            <a:r>
+              <a:rPr lang="en-US" dirty="0"/>
+              <a:t>JavaScript does support classes and bits and pieces of our code create ‘objects’ but our code was not created with object orientation in mind. </a:t>
+            </a:r>
+          </a:p>
+        </p:txBody>
+      </p:sp>
+    </p:spTree>
+    <p:extLst>
+      <p:ext uri="{BB962C8B-B14F-4D97-AF65-F5344CB8AC3E}">
+        <p14:creationId xmlns:p14="http://schemas.microsoft.com/office/powerpoint/2010/main" val="4291083129"/>
+      </p:ext>
+    </p:extLst>
+  </p:cSld>
+  <p:clrMapOvr>
+    <a:masterClrMapping/>
+  </p:clrMapOvr>
+</p:sld>
+</file>
+
 <file path=ppt/theme/theme1.xml><?xml version="1.0" encoding="utf-8"?>
 <a:theme xmlns:a="http://schemas.openxmlformats.org/drawingml/2006/main" name="Gallery">
   <a:themeElements>

</xml_diff>

<commit_message>
Updated Works Cited slide
</commit_message>
<xml_diff>
--- a/MazePrototypePresentation.pptx
+++ b/MazePrototypePresentation.pptx
@@ -116,7 +116,18 @@
   </p:defaultTextStyle>
   <p:extLst>
     <p:ext uri="{EFAFB233-063F-42B5-8137-9DF3F51BA10A}">
-      <p15:sldGuideLst xmlns:p15="http://schemas.microsoft.com/office/powerpoint/2012/main" xmlns=""/>
+      <p15:sldGuideLst xmlns:p15="http://schemas.microsoft.com/office/powerpoint/2012/main">
+        <p15:guide id="1" orient="horz" pos="2160">
+          <p15:clr>
+            <a:srgbClr val="A4A3A4"/>
+          </p15:clr>
+        </p15:guide>
+        <p15:guide id="2" pos="3840">
+          <p15:clr>
+            <a:srgbClr val="A4A3A4"/>
+          </p15:clr>
+        </p15:guide>
+      </p15:sldGuideLst>
     </p:ext>
   </p:extLst>
 </p:presentation>
@@ -3926,33 +3937,56 @@
           <a:p>
             <a:r>
               <a:rPr lang="en-US" sz="1800" dirty="0"/>
-              <a:t>Babylon.js Playground, October 30 2016</a:t>
-            </a:r>
-            <a:r>
-              <a:rPr lang="en-US" sz="1800" dirty="0"/>
-              <a:t>, </a:t>
+              <a:t>Babylon.js Playground, October 30 2016, </a:t>
             </a:r>
             <a:r>
               <a:rPr lang="en-US" sz="1800" dirty="0">
                 <a:hlinkClick r:id="rId5"/>
               </a:rPr>
-              <a:t>http://www.babylonjs-playground.com</a:t>
-            </a:r>
-            <a:r>
-              <a:rPr lang="en-US" sz="1800">
-                <a:hlinkClick r:id="rId5"/>
-              </a:rPr>
-              <a:t>/#</a:t>
-            </a:r>
-            <a:r>
-              <a:rPr lang="en-US" sz="1800" smtClean="0">
+              <a:t>http://www.babylonjs-playground.com/#</a:t>
+            </a:r>
+            <a:r>
+              <a:rPr lang="en-US" sz="1800" dirty="0" smtClean="0">
                 <a:hlinkClick r:id="rId5"/>
               </a:rPr>
               <a:t>4V94Q#14</a:t>
             </a:r>
             <a:r>
+              <a:rPr lang="en-US" sz="1800" dirty="0" smtClean="0"/>
+              <a:t>  </a:t>
+            </a:r>
+            <a:endParaRPr lang="en-US" sz="1800" dirty="0" smtClean="0"/>
+          </a:p>
+          <a:p>
+            <a:r>
+              <a:rPr lang="en-US" sz="1800" dirty="0" smtClean="0"/>
+              <a:t>W3 Schools, HTML </a:t>
+            </a:r>
+            <a:r>
+              <a:rPr lang="en-US" sz="1800"/>
+              <a:t>Game Example, </a:t>
+            </a:r>
+            <a:r>
+              <a:rPr lang="en-US" sz="1800">
+                <a:hlinkClick r:id="rId6"/>
+              </a:rPr>
+              <a:t>http</a:t>
+            </a:r>
+            <a:r>
+              <a:rPr lang="en-US" sz="1800">
+                <a:hlinkClick r:id="rId6"/>
+              </a:rPr>
+              <a:t>://</a:t>
+            </a:r>
+            <a:r>
+              <a:rPr lang="en-US" sz="1800" smtClean="0">
+                <a:hlinkClick r:id="rId6"/>
+              </a:rPr>
+              <a:t>www.w3schools.com/graphics/game_intro.asp</a:t>
+            </a:r>
+            <a:r>
               <a:rPr lang="en-US" sz="1800" smtClean="0"/>
-              <a:t>  </a:t>
+              <a:t> </a:t>
             </a:r>
             <a:endParaRPr lang="en-US" sz="1800" dirty="0"/>
           </a:p>
@@ -6590,7 +6624,7 @@
   <a:extraClrSchemeLst/>
   <a:extLst>
     <a:ext uri="{05A4C25C-085E-4340-85A3-A5531E510DB2}">
-      <thm15:themeFamily xmlns:thm15="http://schemas.microsoft.com/office/thememl/2012/main" xmlns="" name="Gallery" id="{BBFCD31E-59A1-489D-B089-A3EAD7CAE12E}" vid="{F5E91637-A7B6-4E27-B710-77DA7014EE1E}"/>
+      <thm15:themeFamily xmlns:thm15="http://schemas.microsoft.com/office/thememl/2012/main" name="Gallery" id="{BBFCD31E-59A1-489D-B089-A3EAD7CAE12E}" vid="{F5E91637-A7B6-4E27-B710-77DA7014EE1E}"/>
     </a:ext>
   </a:extLst>
 </a:theme>

</xml_diff>

<commit_message>
why do I have to commit all the time?
</commit_message>
<xml_diff>
--- a/MazePrototypePresentation.pptx
+++ b/MazePrototypePresentation.pptx
@@ -6146,8 +6146,15 @@
           <a:p>
             <a:r>
               <a:rPr lang="en-US" sz="1800" dirty="0"/>
-              <a:t>Started with three.js</a:t>
-            </a:r>
+              <a:t>Started with three.js </a:t>
+            </a:r>
+            <a:r>
+              <a:rPr lang="en-US" sz="1800" dirty="0">
+                <a:hlinkClick r:id="rId2"/>
+              </a:rPr>
+              <a:t>http://RebekahManweiler.github.io</a:t>
+            </a:r>
+            <a:endParaRPr lang="en-US" sz="1800" dirty="0"/>
           </a:p>
           <a:p>
             <a:pPr lvl="1"/>
@@ -6187,7 +6194,7 @@
           <a:p>
             <a:r>
               <a:rPr lang="en-US" sz="1800" dirty="0"/>
-              <a:t>Stephen found Babylon</a:t>
+              <a:t>Stephen found Babylon </a:t>
             </a:r>
           </a:p>
           <a:p>

</xml_diff>

<commit_message>
Added all documentation, organized folders
</commit_message>
<xml_diff>
--- a/MazePrototypePresentation.pptx
+++ b/MazePrototypePresentation.pptx
@@ -7,8 +7,8 @@
   <p:sldIdLst>
     <p:sldId id="256" r:id="rId2"/>
     <p:sldId id="257" r:id="rId3"/>
-    <p:sldId id="264" r:id="rId4"/>
-    <p:sldId id="258" r:id="rId5"/>
+    <p:sldId id="258" r:id="rId4"/>
+    <p:sldId id="264" r:id="rId5"/>
     <p:sldId id="265" r:id="rId6"/>
     <p:sldId id="259" r:id="rId7"/>
     <p:sldId id="260" r:id="rId8"/>
@@ -116,7 +116,7 @@
   </p:defaultTextStyle>
   <p:extLst>
     <p:ext uri="{EFAFB233-063F-42B5-8137-9DF3F51BA10A}">
-      <p15:sldGuideLst xmlns:p15="http://schemas.microsoft.com/office/powerpoint/2012/main">
+      <p15:sldGuideLst xmlns="" xmlns:p15="http://schemas.microsoft.com/office/powerpoint/2012/main">
         <p15:guide id="1" orient="horz" pos="2160">
           <p15:clr>
             <a:srgbClr val="A4A3A4"/>
@@ -3955,7 +3955,6 @@
               <a:rPr lang="en-US" sz="1800" dirty="0" smtClean="0"/>
               <a:t>  </a:t>
             </a:r>
-            <a:endParaRPr lang="en-US" sz="1800" dirty="0" smtClean="0"/>
           </a:p>
           <a:p>
             <a:r>
@@ -3970,13 +3969,7 @@
               <a:rPr lang="en-US" sz="1800">
                 <a:hlinkClick r:id="rId6"/>
               </a:rPr>
-              <a:t>http</a:t>
-            </a:r>
-            <a:r>
-              <a:rPr lang="en-US" sz="1800">
-                <a:hlinkClick r:id="rId6"/>
-              </a:rPr>
-              <a:t>://</a:t>
+              <a:t>http://</a:t>
             </a:r>
             <a:r>
               <a:rPr lang="en-US" sz="1800" smtClean="0">
@@ -4148,14 +4141,14 @@
           <a:p>
             <a:r>
               <a:rPr lang="en-US" dirty="0"/>
-              <a:t>Product Flow – Display setup</a:t>
+              <a:t>Product Flow – Maze Generator</a:t>
             </a:r>
           </a:p>
         </p:txBody>
       </p:sp>
       <p:pic>
         <p:nvPicPr>
-          <p:cNvPr id="5" name="Content Placeholder 4"/>
+          <p:cNvPr id="6" name="Content Placeholder 5"/>
           <p:cNvPicPr>
             <a:picLocks noGrp="1" noChangeAspect="1"/>
           </p:cNvPicPr>
@@ -4171,19 +4164,19 @@
               </a:ext>
             </a:extLst>
           </a:blip>
-          <a:srcRect l="29035" r="39239"/>
+          <a:srcRect r="70880"/>
           <a:stretch/>
         </p:blipFill>
         <p:spPr>
           <a:xfrm>
-            <a:off x="186431" y="2017343"/>
-            <a:ext cx="3551068" cy="3788242"/>
+            <a:off x="288846" y="2017343"/>
+            <a:ext cx="3155689" cy="3667796"/>
           </a:xfrm>
         </p:spPr>
       </p:pic>
       <p:sp>
         <p:nvSpPr>
-          <p:cNvPr id="4" name="Content Placeholder 3"/>
+          <p:cNvPr id="5" name="Content Placeholder 4"/>
           <p:cNvSpPr>
             <a:spLocks noGrp="1"/>
           </p:cNvSpPr>
@@ -4193,14 +4186,30 @@
         </p:nvSpPr>
         <p:spPr>
           <a:xfrm>
-            <a:off x="3932808" y="2017343"/>
-            <a:ext cx="7126115" cy="3788242"/>
+            <a:off x="3719743" y="2017343"/>
+            <a:ext cx="7339179" cy="3667796"/>
           </a:xfrm>
         </p:spPr>
         <p:txBody>
           <a:bodyPr/>
           <a:lstStyle/>
           <a:p>
+            <a:r>
+              <a:rPr lang="en-US" dirty="0" smtClean="0"/>
+              <a:t>Maze Generator uses Depth-First Search algorithm</a:t>
+            </a:r>
+          </a:p>
+          <a:p>
+            <a:r>
+              <a:rPr lang="en-US" dirty="0" smtClean="0"/>
+              <a:t>Leads to long hallways, but plenty of dead-ends</a:t>
+            </a:r>
+          </a:p>
+          <a:p>
+            <a:r>
+              <a:rPr lang="en-US" dirty="0" smtClean="0"/>
+              <a:t>Places holes at all dead-ends</a:t>
+            </a:r>
             <a:endParaRPr lang="en-US" dirty="0"/>
           </a:p>
         </p:txBody>
@@ -4208,7 +4217,7 @@
     </p:spTree>
     <p:extLst>
       <p:ext uri="{BB962C8B-B14F-4D97-AF65-F5344CB8AC3E}">
-        <p14:creationId xmlns:p14="http://schemas.microsoft.com/office/powerpoint/2010/main" val="1378639110"/>
+        <p14:creationId xmlns:p14="http://schemas.microsoft.com/office/powerpoint/2010/main" val="569452949"/>
       </p:ext>
     </p:extLst>
   </p:cSld>
@@ -4252,14 +4261,14 @@
           <a:p>
             <a:r>
               <a:rPr lang="en-US" dirty="0"/>
-              <a:t>Product Flow – Maze Generator</a:t>
+              <a:t>Product Flow – Display setup</a:t>
             </a:r>
           </a:p>
         </p:txBody>
       </p:sp>
       <p:pic>
         <p:nvPicPr>
-          <p:cNvPr id="6" name="Content Placeholder 5"/>
+          <p:cNvPr id="5" name="Content Placeholder 4"/>
           <p:cNvPicPr>
             <a:picLocks noGrp="1" noChangeAspect="1"/>
           </p:cNvPicPr>
@@ -4275,19 +4284,19 @@
               </a:ext>
             </a:extLst>
           </a:blip>
-          <a:srcRect r="70880"/>
+          <a:srcRect l="29035" r="39239"/>
           <a:stretch/>
         </p:blipFill>
         <p:spPr>
           <a:xfrm>
-            <a:off x="288846" y="2017343"/>
-            <a:ext cx="3155689" cy="3667796"/>
+            <a:off x="186431" y="2017343"/>
+            <a:ext cx="3551068" cy="3788242"/>
           </a:xfrm>
         </p:spPr>
       </p:pic>
       <p:sp>
         <p:nvSpPr>
-          <p:cNvPr id="5" name="Content Placeholder 4"/>
+          <p:cNvPr id="4" name="Content Placeholder 3"/>
           <p:cNvSpPr>
             <a:spLocks noGrp="1"/>
           </p:cNvSpPr>
@@ -4297,13 +4306,31 @@
         </p:nvSpPr>
         <p:spPr>
           <a:xfrm>
-            <a:off x="3719743" y="2017343"/>
-            <a:ext cx="7339179" cy="3667796"/>
+            <a:off x="3932808" y="2017343"/>
+            <a:ext cx="7126115" cy="3788242"/>
           </a:xfrm>
         </p:spPr>
         <p:txBody>
           <a:bodyPr/>
           <a:lstStyle/>
+          <a:p>
+            <a:r>
+              <a:rPr lang="en-US" dirty="0" smtClean="0"/>
+              <a:t>Display setup draws the canvas to the page</a:t>
+            </a:r>
+          </a:p>
+          <a:p>
+            <a:r>
+              <a:rPr lang="en-US" dirty="0" smtClean="0"/>
+              <a:t>Each wall, hole, and character is a component on the page</a:t>
+            </a:r>
+          </a:p>
+          <a:p>
+            <a:r>
+              <a:rPr lang="en-US" dirty="0" smtClean="0"/>
+              <a:t>Key Bindings are assigned when the display is setup</a:t>
+            </a:r>
+          </a:p>
           <a:p>
             <a:endParaRPr lang="en-US" dirty="0"/>
           </a:p>
@@ -4312,7 +4339,7 @@
     </p:spTree>
     <p:extLst>
       <p:ext uri="{BB962C8B-B14F-4D97-AF65-F5344CB8AC3E}">
-        <p14:creationId xmlns:p14="http://schemas.microsoft.com/office/powerpoint/2010/main" val="569452949"/>
+        <p14:creationId xmlns:p14="http://schemas.microsoft.com/office/powerpoint/2010/main" val="1378639110"/>
       </p:ext>
     </p:extLst>
   </p:cSld>
@@ -4409,6 +4436,16 @@
           <a:bodyPr/>
           <a:lstStyle/>
           <a:p>
+            <a:r>
+              <a:rPr lang="en-US" dirty="0" smtClean="0"/>
+              <a:t>Game Runner calls the display setup, which calls the maze generator</a:t>
+            </a:r>
+          </a:p>
+          <a:p>
+            <a:r>
+              <a:rPr lang="en-US" dirty="0" smtClean="0"/>
+              <a:t>Reacts to user input, calling the display to update accordingly and ensure level completion or hole interactions are successful.</a:t>
+            </a:r>
             <a:endParaRPr lang="en-US" dirty="0"/>
           </a:p>
         </p:txBody>
@@ -6122,6 +6159,40 @@
           <a:bodyPr/>
           <a:lstStyle/>
           <a:p>
+            <a:r>
+              <a:rPr lang="en-US" dirty="0" smtClean="0"/>
+              <a:t>Just an overhead showcase of how the user would move in a 3D maze.</a:t>
+            </a:r>
+          </a:p>
+          <a:p>
+            <a:r>
+              <a:rPr lang="en-US" dirty="0" smtClean="0"/>
+              <a:t>Allows user to change their “direction” they are looking and includes traps to show how those interactions would happen.</a:t>
+            </a:r>
+          </a:p>
+          <a:p>
+            <a:r>
+              <a:rPr lang="en-US" dirty="0" smtClean="0"/>
+              <a:t>Allows user to move and “solve” levels, showcasing how the game progression works in adding holes and randomly generating future levels.</a:t>
+            </a:r>
+          </a:p>
+          <a:p>
+            <a:r>
+              <a:rPr lang="en-US" dirty="0">
+                <a:hlinkClick r:id="rId2"/>
+              </a:rPr>
+              <a:t>https://people.eecs.ku.edu/~</a:t>
+            </a:r>
+            <a:r>
+              <a:rPr lang="en-US" dirty="0" smtClean="0">
+                <a:hlinkClick r:id="rId2"/>
+              </a:rPr>
+              <a:t>sfulton/MazeWalkThrough/Test.html</a:t>
+            </a:r>
+            <a:r>
+              <a:rPr lang="en-US" dirty="0" smtClean="0"/>
+              <a:t> </a:t>
+            </a:r>
             <a:endParaRPr lang="en-US" dirty="0"/>
           </a:p>
         </p:txBody>
@@ -6191,7 +6262,7 @@
         <p:spPr/>
         <p:txBody>
           <a:bodyPr>
-            <a:normAutofit fontScale="85000" lnSpcReduction="20000"/>
+            <a:normAutofit fontScale="77500" lnSpcReduction="20000"/>
           </a:bodyPr>
           <a:lstStyle/>
           <a:p>
@@ -6273,8 +6344,32 @@
             <a:pPr lvl="2"/>
             <a:r>
               <a:rPr lang="en-US" sz="1400" dirty="0"/>
-              <a:t>Used predefined textures from Babylon</a:t>
-            </a:r>
+              <a:t>Used predefined textures from </a:t>
+            </a:r>
+            <a:r>
+              <a:rPr lang="en-US" sz="1400" dirty="0" smtClean="0"/>
+              <a:t>Babylon</a:t>
+            </a:r>
+          </a:p>
+          <a:p>
+            <a:pPr lvl="2"/>
+            <a:r>
+              <a:rPr lang="en-US" sz="1400" dirty="0">
+                <a:hlinkClick r:id="rId2"/>
+              </a:rPr>
+              <a:t>http://www.babylonjs-playground.com/#</a:t>
+            </a:r>
+            <a:r>
+              <a:rPr lang="en-US" sz="1400" dirty="0" smtClean="0">
+                <a:hlinkClick r:id="rId2"/>
+              </a:rPr>
+              <a:t>4V94Q#14</a:t>
+            </a:r>
+            <a:r>
+              <a:rPr lang="en-US" sz="1400" dirty="0" smtClean="0"/>
+              <a:t> </a:t>
+            </a:r>
+            <a:endParaRPr lang="en-US" sz="1400" dirty="0"/>
           </a:p>
         </p:txBody>
       </p:sp>
@@ -6353,7 +6448,27 @@
           <a:p>
             <a:r>
               <a:rPr lang="en-US" dirty="0"/>
-              <a:t>The 2D maze game is fun and it shows how the 3D game will eventually work, but most of the 2D code will be useless in the 3D game.</a:t>
+              <a:t>The 2D maze game is fun and it shows how the 3D game will eventually work, but </a:t>
+            </a:r>
+            <a:r>
+              <a:rPr lang="en-US" dirty="0" smtClean="0"/>
+              <a:t>a fair amount</a:t>
+            </a:r>
+            <a:r>
+              <a:rPr lang="en-US" dirty="0" smtClean="0"/>
+              <a:t> </a:t>
+            </a:r>
+            <a:r>
+              <a:rPr lang="en-US" dirty="0"/>
+              <a:t>of the 2D code will be </a:t>
+            </a:r>
+            <a:r>
+              <a:rPr lang="en-US" dirty="0" smtClean="0"/>
+              <a:t>cut in </a:t>
+            </a:r>
+            <a:r>
+              <a:rPr lang="en-US" dirty="0"/>
+              <a:t>the 3D game.</a:t>
             </a:r>
           </a:p>
           <a:p>
@@ -6624,7 +6739,7 @@
   <a:extraClrSchemeLst/>
   <a:extLst>
     <a:ext uri="{05A4C25C-085E-4340-85A3-A5531E510DB2}">
-      <thm15:themeFamily xmlns:thm15="http://schemas.microsoft.com/office/thememl/2012/main" name="Gallery" id="{BBFCD31E-59A1-489D-B089-A3EAD7CAE12E}" vid="{F5E91637-A7B6-4E27-B710-77DA7014EE1E}"/>
+      <thm15:themeFamily xmlns="" xmlns:thm15="http://schemas.microsoft.com/office/thememl/2012/main" name="Gallery" id="{BBFCD31E-59A1-489D-B089-A3EAD7CAE12E}" vid="{F5E91637-A7B6-4E27-B710-77DA7014EE1E}"/>
     </a:ext>
   </a:extLst>
 </a:theme>

</xml_diff>